<commit_message>
Second round of responding to Dr. E's feedback. Introduce idea of sub-strategies, shorten captions, update strategy tree figure
</commit_message>
<xml_diff>
--- a/Strategy-Encapsulation-Paper/strategy description format.pptx
+++ b/Strategy-Encapsulation-Paper/strategy description format.pptx
@@ -105,6 +105,11 @@
       </a:defRPr>
     </a:lvl9pPr>
   </p:defaultTextStyle>
+  <p:extLst>
+    <p:ext uri="{EFAFB233-063F-42B5-8137-9DF3F51BA10A}">
+      <p15:sldGuideLst xmlns:p15="http://schemas.microsoft.com/office/powerpoint/2012/main"/>
+    </p:ext>
+  </p:extLst>
 </p:presentation>
 </file>
 
@@ -239,7 +244,7 @@
           <a:p>
             <a:fld id="{67967574-EAC9-4726-B126-F1796D4AAC16}" type="datetimeFigureOut">
               <a:rPr lang="en-US" smtClean="0"/>
-              <a:t>11/18/2015</a:t>
+              <a:t>11/19/2015</a:t>
             </a:fld>
             <a:endParaRPr lang="en-US"/>
           </a:p>
@@ -409,7 +414,7 @@
           <a:p>
             <a:fld id="{67967574-EAC9-4726-B126-F1796D4AAC16}" type="datetimeFigureOut">
               <a:rPr lang="en-US" smtClean="0"/>
-              <a:t>11/18/2015</a:t>
+              <a:t>11/19/2015</a:t>
             </a:fld>
             <a:endParaRPr lang="en-US"/>
           </a:p>
@@ -589,7 +594,7 @@
           <a:p>
             <a:fld id="{67967574-EAC9-4726-B126-F1796D4AAC16}" type="datetimeFigureOut">
               <a:rPr lang="en-US" smtClean="0"/>
-              <a:t>11/18/2015</a:t>
+              <a:t>11/19/2015</a:t>
             </a:fld>
             <a:endParaRPr lang="en-US"/>
           </a:p>
@@ -759,7 +764,7 @@
           <a:p>
             <a:fld id="{67967574-EAC9-4726-B126-F1796D4AAC16}" type="datetimeFigureOut">
               <a:rPr lang="en-US" smtClean="0"/>
-              <a:t>11/18/2015</a:t>
+              <a:t>11/19/2015</a:t>
             </a:fld>
             <a:endParaRPr lang="en-US"/>
           </a:p>
@@ -1005,7 +1010,7 @@
           <a:p>
             <a:fld id="{67967574-EAC9-4726-B126-F1796D4AAC16}" type="datetimeFigureOut">
               <a:rPr lang="en-US" smtClean="0"/>
-              <a:t>11/18/2015</a:t>
+              <a:t>11/19/2015</a:t>
             </a:fld>
             <a:endParaRPr lang="en-US"/>
           </a:p>
@@ -1237,7 +1242,7 @@
           <a:p>
             <a:fld id="{67967574-EAC9-4726-B126-F1796D4AAC16}" type="datetimeFigureOut">
               <a:rPr lang="en-US" smtClean="0"/>
-              <a:t>11/18/2015</a:t>
+              <a:t>11/19/2015</a:t>
             </a:fld>
             <a:endParaRPr lang="en-US"/>
           </a:p>
@@ -1604,7 +1609,7 @@
           <a:p>
             <a:fld id="{67967574-EAC9-4726-B126-F1796D4AAC16}" type="datetimeFigureOut">
               <a:rPr lang="en-US" smtClean="0"/>
-              <a:t>11/18/2015</a:t>
+              <a:t>11/19/2015</a:t>
             </a:fld>
             <a:endParaRPr lang="en-US"/>
           </a:p>
@@ -1722,7 +1727,7 @@
           <a:p>
             <a:fld id="{67967574-EAC9-4726-B126-F1796D4AAC16}" type="datetimeFigureOut">
               <a:rPr lang="en-US" smtClean="0"/>
-              <a:t>11/18/2015</a:t>
+              <a:t>11/19/2015</a:t>
             </a:fld>
             <a:endParaRPr lang="en-US"/>
           </a:p>
@@ -1817,7 +1822,7 @@
           <a:p>
             <a:fld id="{67967574-EAC9-4726-B126-F1796D4AAC16}" type="datetimeFigureOut">
               <a:rPr lang="en-US" smtClean="0"/>
-              <a:t>11/18/2015</a:t>
+              <a:t>11/19/2015</a:t>
             </a:fld>
             <a:endParaRPr lang="en-US"/>
           </a:p>
@@ -2094,7 +2099,7 @@
           <a:p>
             <a:fld id="{67967574-EAC9-4726-B126-F1796D4AAC16}" type="datetimeFigureOut">
               <a:rPr lang="en-US" smtClean="0"/>
-              <a:t>11/18/2015</a:t>
+              <a:t>11/19/2015</a:t>
             </a:fld>
             <a:endParaRPr lang="en-US"/>
           </a:p>
@@ -2351,7 +2356,7 @@
           <a:p>
             <a:fld id="{67967574-EAC9-4726-B126-F1796D4AAC16}" type="datetimeFigureOut">
               <a:rPr lang="en-US" smtClean="0"/>
-              <a:t>11/18/2015</a:t>
+              <a:t>11/19/2015</a:t>
             </a:fld>
             <a:endParaRPr lang="en-US"/>
           </a:p>
@@ -2564,7 +2569,7 @@
           <a:p>
             <a:fld id="{67967574-EAC9-4726-B126-F1796D4AAC16}" type="datetimeFigureOut">
               <a:rPr lang="en-US" smtClean="0"/>
-              <a:t>11/18/2015</a:t>
+              <a:t>11/19/2015</a:t>
             </a:fld>
             <a:endParaRPr lang="en-US"/>
           </a:p>
@@ -3118,11 +3123,11 @@
   <p:clrMapOvr>
     <a:masterClrMapping/>
   </p:clrMapOvr>
-  <mc:AlternateContent xmlns:mc="http://schemas.openxmlformats.org/markup-compatibility/2006">
-    <mc:Choice xmlns:p14="http://schemas.microsoft.com/office/powerpoint/2010/main" Requires="p14">
+  <mc:AlternateContent xmlns:mc="http://schemas.openxmlformats.org/markup-compatibility/2006" xmlns:p14="http://schemas.microsoft.com/office/powerpoint/2010/main">
+    <mc:Choice Requires="p14">
       <p:transition spd="slow" p14:dur="2000"/>
     </mc:Choice>
-    <mc:Fallback>
+    <mc:Fallback xmlns="">
       <p:transition spd="slow"/>
     </mc:Fallback>
   </mc:AlternateContent>
@@ -3178,9 +3183,18 @@
               <a:buChar char="•"/>
             </a:pPr>
             <a:r>
-              <a:rPr lang="en-US" sz="2800" dirty="0"/>
-              <a:t>Resolve the defect</a:t>
-            </a:r>
+              <a:rPr lang="en-US" sz="2800" dirty="0" smtClean="0"/>
+              <a:t>Participant 1: Resolve </a:t>
+            </a:r>
+            <a:r>
+              <a:rPr lang="en-US" sz="2800" dirty="0" err="1" smtClean="0"/>
+              <a:t>FindBugs</a:t>
+            </a:r>
+            <a:r>
+              <a:rPr lang="en-US" sz="2800" dirty="0" smtClean="0"/>
+              <a:t> NPE defect</a:t>
+            </a:r>
+            <a:endParaRPr lang="en-US" sz="2800" dirty="0"/>
           </a:p>
           <a:p>
             <a:pPr marL="742873" lvl="1" indent="-285720">
@@ -3188,9 +3202,14 @@
               <a:buChar char="•"/>
             </a:pPr>
             <a:r>
-              <a:rPr lang="en-US" sz="2800" dirty="0"/>
-              <a:t>Search for more information on the web</a:t>
-            </a:r>
+              <a:rPr lang="en-US" sz="2800" dirty="0" smtClean="0"/>
+              <a:t>Search web for causes of </a:t>
+            </a:r>
+            <a:r>
+              <a:rPr lang="en-US" sz="2800" dirty="0" err="1" smtClean="0"/>
+              <a:t>NullPointerExceptions</a:t>
+            </a:r>
+            <a:endParaRPr lang="en-US" sz="2800" dirty="0"/>
           </a:p>
           <a:p>
             <a:pPr marL="1200026" lvl="2" indent="-285720">
@@ -3229,7 +3248,15 @@
             </a:pPr>
             <a:r>
               <a:rPr lang="en-US" sz="2800" dirty="0"/>
-              <a:t>Use a tool to navigate to conditional statements</a:t>
+              <a:t>Use </a:t>
+            </a:r>
+            <a:r>
+              <a:rPr lang="en-US" sz="2800" dirty="0" smtClean="0"/>
+              <a:t>`Call Hierarchy’ to </a:t>
+            </a:r>
+            <a:r>
+              <a:rPr lang="en-US" sz="2800" dirty="0"/>
+              <a:t>navigate to conditional statements</a:t>
             </a:r>
           </a:p>
           <a:p>
@@ -3244,13 +3271,21 @@
           </a:p>
           <a:p>
             <a:pPr lvl="2"/>
+            <a:r>
+              <a:rPr lang="en-US" sz="2800" dirty="0">
+                <a:solidFill>
+                  <a:schemeClr val="accent6"/>
+                </a:solidFill>
+              </a:rPr>
+              <a:t>+</a:t>
+            </a:r>
             <a:r>
               <a:rPr lang="en-US" sz="2800" i="1" dirty="0">
                 <a:solidFill>
                   <a:schemeClr val="accent6"/>
                 </a:solidFill>
               </a:rPr>
-              <a:t>+ Correctly identifies input that causes the branch to execute</a:t>
+              <a:t> Correctly identifies input that causes the branch to execute</a:t>
             </a:r>
           </a:p>
           <a:p>
@@ -3260,8 +3295,13 @@
             </a:pPr>
             <a:r>
               <a:rPr lang="en-US" sz="2800" dirty="0"/>
-              <a:t>Fix the defect</a:t>
-            </a:r>
+              <a:t>Fix the </a:t>
+            </a:r>
+            <a:r>
+              <a:rPr lang="en-US" sz="2800" dirty="0" smtClean="0"/>
+              <a:t>defect by modifying the code</a:t>
+            </a:r>
+            <a:endParaRPr lang="en-US" sz="2800" dirty="0"/>
           </a:p>
           <a:p>
             <a:pPr marL="1200026" lvl="2" indent="-285720">
@@ -3275,13 +3315,29 @@
           </a:p>
           <a:p>
             <a:pPr lvl="2"/>
+            <a:r>
+              <a:rPr lang="en-US" sz="2800" b="1" dirty="0">
+                <a:solidFill>
+                  <a:srgbClr val="C00000"/>
+                </a:solidFill>
+              </a:rPr>
+              <a:t>−</a:t>
+            </a:r>
+            <a:r>
+              <a:rPr lang="en-US" sz="2800" i="1" dirty="0" smtClean="0">
+                <a:solidFill>
+                  <a:srgbClr val="C00000"/>
+                </a:solidFill>
+              </a:rPr>
+              <a:t> </a:t>
+            </a:r>
             <a:r>
               <a:rPr lang="en-US" sz="2800" i="1" dirty="0">
                 <a:solidFill>
                   <a:srgbClr val="C00000"/>
                 </a:solidFill>
               </a:rPr>
-              <a:t>- Code modification introduces a compilation error</a:t>
+              <a:t>Code modification introduces a compilation error</a:t>
             </a:r>
           </a:p>
         </p:txBody>

</xml_diff>

<commit_message>
Update strategy description format ppt
</commit_message>
<xml_diff>
--- a/Strategy-Encapsulation-Paper/strategy description format.pptx
+++ b/Strategy-Encapsulation-Paper/strategy description format.pptx
@@ -4,9 +4,14 @@
   <p:sldMasterIdLst>
     <p:sldMasterId id="2147483660" r:id="rId1"/>
   </p:sldMasterIdLst>
+  <p:notesMasterIdLst>
+    <p:notesMasterId r:id="rId6"/>
+  </p:notesMasterIdLst>
   <p:sldIdLst>
     <p:sldId id="257" r:id="rId2"/>
     <p:sldId id="258" r:id="rId3"/>
+    <p:sldId id="259" r:id="rId4"/>
+    <p:sldId id="260" r:id="rId5"/>
   </p:sldIdLst>
   <p:sldSz cx="9875838" cy="4754563"/>
   <p:notesSz cx="6858000" cy="9144000"/>
@@ -113,6 +118,608 @@
 </p:presentation>
 </file>
 
+<file path=ppt/notesMasters/notesMaster1.xml><?xml version="1.0" encoding="utf-8"?>
+<p:notesMaster xmlns:a="http://schemas.openxmlformats.org/drawingml/2006/main" xmlns:r="http://schemas.openxmlformats.org/officeDocument/2006/relationships" xmlns:p="http://schemas.openxmlformats.org/presentationml/2006/main">
+  <p:cSld>
+    <p:bg>
+      <p:bgRef idx="1001">
+        <a:schemeClr val="bg1"/>
+      </p:bgRef>
+    </p:bg>
+    <p:spTree>
+      <p:nvGrpSpPr>
+        <p:cNvPr id="1" name=""/>
+        <p:cNvGrpSpPr/>
+        <p:nvPr/>
+      </p:nvGrpSpPr>
+      <p:grpSpPr>
+        <a:xfrm>
+          <a:off x="0" y="0"/>
+          <a:ext cx="0" cy="0"/>
+          <a:chOff x="0" y="0"/>
+          <a:chExt cx="0" cy="0"/>
+        </a:xfrm>
+      </p:grpSpPr>
+      <p:sp>
+        <p:nvSpPr>
+          <p:cNvPr id="2" name="Header Placeholder 1"/>
+          <p:cNvSpPr>
+            <a:spLocks noGrp="1"/>
+          </p:cNvSpPr>
+          <p:nvPr>
+            <p:ph type="hdr" sz="quarter"/>
+          </p:nvPr>
+        </p:nvSpPr>
+        <p:spPr>
+          <a:xfrm>
+            <a:off x="0" y="0"/>
+            <a:ext cx="2971800" cy="458788"/>
+          </a:xfrm>
+          <a:prstGeom prst="rect">
+            <a:avLst/>
+          </a:prstGeom>
+        </p:spPr>
+        <p:txBody>
+          <a:bodyPr vert="horz" lIns="91440" tIns="45720" rIns="91440" bIns="45720" rtlCol="0"/>
+          <a:lstStyle>
+            <a:lvl1pPr algn="l">
+              <a:defRPr sz="1200"/>
+            </a:lvl1pPr>
+          </a:lstStyle>
+          <a:p>
+            <a:endParaRPr lang="en-US"/>
+          </a:p>
+        </p:txBody>
+      </p:sp>
+      <p:sp>
+        <p:nvSpPr>
+          <p:cNvPr id="3" name="Date Placeholder 2"/>
+          <p:cNvSpPr>
+            <a:spLocks noGrp="1"/>
+          </p:cNvSpPr>
+          <p:nvPr>
+            <p:ph type="dt" idx="1"/>
+          </p:nvPr>
+        </p:nvSpPr>
+        <p:spPr>
+          <a:xfrm>
+            <a:off x="3884613" y="0"/>
+            <a:ext cx="2971800" cy="458788"/>
+          </a:xfrm>
+          <a:prstGeom prst="rect">
+            <a:avLst/>
+          </a:prstGeom>
+        </p:spPr>
+        <p:txBody>
+          <a:bodyPr vert="horz" lIns="91440" tIns="45720" rIns="91440" bIns="45720" rtlCol="0"/>
+          <a:lstStyle>
+            <a:lvl1pPr algn="r">
+              <a:defRPr sz="1200"/>
+            </a:lvl1pPr>
+          </a:lstStyle>
+          <a:p>
+            <a:fld id="{503E5FED-F865-4985-935B-99FB1FA64E45}" type="datetimeFigureOut">
+              <a:rPr lang="en-US" smtClean="0"/>
+              <a:t>5/12/2016</a:t>
+            </a:fld>
+            <a:endParaRPr lang="en-US"/>
+          </a:p>
+        </p:txBody>
+      </p:sp>
+      <p:sp>
+        <p:nvSpPr>
+          <p:cNvPr id="4" name="Slide Image Placeholder 3"/>
+          <p:cNvSpPr>
+            <a:spLocks noGrp="1" noRot="1" noChangeAspect="1"/>
+          </p:cNvSpPr>
+          <p:nvPr>
+            <p:ph type="sldImg" idx="2"/>
+          </p:nvPr>
+        </p:nvSpPr>
+        <p:spPr>
+          <a:xfrm>
+            <a:off x="225425" y="1143000"/>
+            <a:ext cx="6407150" cy="3086100"/>
+          </a:xfrm>
+          <a:prstGeom prst="rect">
+            <a:avLst/>
+          </a:prstGeom>
+          <a:noFill/>
+          <a:ln w="12700">
+            <a:solidFill>
+              <a:prstClr val="black"/>
+            </a:solidFill>
+          </a:ln>
+        </p:spPr>
+        <p:txBody>
+          <a:bodyPr vert="horz" lIns="91440" tIns="45720" rIns="91440" bIns="45720" rtlCol="0" anchor="ctr"/>
+          <a:lstStyle/>
+          <a:p>
+            <a:endParaRPr lang="en-US"/>
+          </a:p>
+        </p:txBody>
+      </p:sp>
+      <p:sp>
+        <p:nvSpPr>
+          <p:cNvPr id="5" name="Notes Placeholder 4"/>
+          <p:cNvSpPr>
+            <a:spLocks noGrp="1"/>
+          </p:cNvSpPr>
+          <p:nvPr>
+            <p:ph type="body" sz="quarter" idx="3"/>
+          </p:nvPr>
+        </p:nvSpPr>
+        <p:spPr>
+          <a:xfrm>
+            <a:off x="685800" y="4400550"/>
+            <a:ext cx="5486400" cy="3600450"/>
+          </a:xfrm>
+          <a:prstGeom prst="rect">
+            <a:avLst/>
+          </a:prstGeom>
+        </p:spPr>
+        <p:txBody>
+          <a:bodyPr vert="horz" lIns="91440" tIns="45720" rIns="91440" bIns="45720" rtlCol="0"/>
+          <a:lstStyle/>
+          <a:p>
+            <a:pPr lvl="0"/>
+            <a:r>
+              <a:rPr lang="en-US" smtClean="0"/>
+              <a:t>Click to edit Master text styles</a:t>
+            </a:r>
+          </a:p>
+          <a:p>
+            <a:pPr lvl="1"/>
+            <a:r>
+              <a:rPr lang="en-US" smtClean="0"/>
+              <a:t>Second level</a:t>
+            </a:r>
+          </a:p>
+          <a:p>
+            <a:pPr lvl="2"/>
+            <a:r>
+              <a:rPr lang="en-US" smtClean="0"/>
+              <a:t>Third level</a:t>
+            </a:r>
+          </a:p>
+          <a:p>
+            <a:pPr lvl="3"/>
+            <a:r>
+              <a:rPr lang="en-US" smtClean="0"/>
+              <a:t>Fourth level</a:t>
+            </a:r>
+          </a:p>
+          <a:p>
+            <a:pPr lvl="4"/>
+            <a:r>
+              <a:rPr lang="en-US" smtClean="0"/>
+              <a:t>Fifth level</a:t>
+            </a:r>
+            <a:endParaRPr lang="en-US"/>
+          </a:p>
+        </p:txBody>
+      </p:sp>
+      <p:sp>
+        <p:nvSpPr>
+          <p:cNvPr id="6" name="Footer Placeholder 5"/>
+          <p:cNvSpPr>
+            <a:spLocks noGrp="1"/>
+          </p:cNvSpPr>
+          <p:nvPr>
+            <p:ph type="ftr" sz="quarter" idx="4"/>
+          </p:nvPr>
+        </p:nvSpPr>
+        <p:spPr>
+          <a:xfrm>
+            <a:off x="0" y="8685213"/>
+            <a:ext cx="2971800" cy="458787"/>
+          </a:xfrm>
+          <a:prstGeom prst="rect">
+            <a:avLst/>
+          </a:prstGeom>
+        </p:spPr>
+        <p:txBody>
+          <a:bodyPr vert="horz" lIns="91440" tIns="45720" rIns="91440" bIns="45720" rtlCol="0" anchor="b"/>
+          <a:lstStyle>
+            <a:lvl1pPr algn="l">
+              <a:defRPr sz="1200"/>
+            </a:lvl1pPr>
+          </a:lstStyle>
+          <a:p>
+            <a:endParaRPr lang="en-US"/>
+          </a:p>
+        </p:txBody>
+      </p:sp>
+      <p:sp>
+        <p:nvSpPr>
+          <p:cNvPr id="7" name="Slide Number Placeholder 6"/>
+          <p:cNvSpPr>
+            <a:spLocks noGrp="1"/>
+          </p:cNvSpPr>
+          <p:nvPr>
+            <p:ph type="sldNum" sz="quarter" idx="5"/>
+          </p:nvPr>
+        </p:nvSpPr>
+        <p:spPr>
+          <a:xfrm>
+            <a:off x="3884613" y="8685213"/>
+            <a:ext cx="2971800" cy="458787"/>
+          </a:xfrm>
+          <a:prstGeom prst="rect">
+            <a:avLst/>
+          </a:prstGeom>
+        </p:spPr>
+        <p:txBody>
+          <a:bodyPr vert="horz" lIns="91440" tIns="45720" rIns="91440" bIns="45720" rtlCol="0" anchor="b"/>
+          <a:lstStyle>
+            <a:lvl1pPr algn="r">
+              <a:defRPr sz="1200"/>
+            </a:lvl1pPr>
+          </a:lstStyle>
+          <a:p>
+            <a:fld id="{2A4B3E60-23B9-4895-BA16-8C2392A23D0E}" type="slidenum">
+              <a:rPr lang="en-US" smtClean="0"/>
+              <a:t>‹#›</a:t>
+            </a:fld>
+            <a:endParaRPr lang="en-US"/>
+          </a:p>
+        </p:txBody>
+      </p:sp>
+    </p:spTree>
+    <p:extLst>
+      <p:ext uri="{BB962C8B-B14F-4D97-AF65-F5344CB8AC3E}">
+        <p14:creationId xmlns:p14="http://schemas.microsoft.com/office/powerpoint/2010/main" val="2436478537"/>
+      </p:ext>
+    </p:extLst>
+  </p:cSld>
+  <p:clrMap bg1="lt1" tx1="dk1" bg2="lt2" tx2="dk2" accent1="accent1" accent2="accent2" accent3="accent3" accent4="accent4" accent5="accent5" accent6="accent6" hlink="hlink" folHlink="folHlink"/>
+  <p:notesStyle>
+    <a:lvl1pPr marL="0" algn="l" defTabSz="914400" rtl="0" eaLnBrk="1" latinLnBrk="0" hangingPunct="1">
+      <a:defRPr sz="1200" kern="1200">
+        <a:solidFill>
+          <a:schemeClr val="tx1"/>
+        </a:solidFill>
+        <a:latin typeface="+mn-lt"/>
+        <a:ea typeface="+mn-ea"/>
+        <a:cs typeface="+mn-cs"/>
+      </a:defRPr>
+    </a:lvl1pPr>
+    <a:lvl2pPr marL="457200" algn="l" defTabSz="914400" rtl="0" eaLnBrk="1" latinLnBrk="0" hangingPunct="1">
+      <a:defRPr sz="1200" kern="1200">
+        <a:solidFill>
+          <a:schemeClr val="tx1"/>
+        </a:solidFill>
+        <a:latin typeface="+mn-lt"/>
+        <a:ea typeface="+mn-ea"/>
+        <a:cs typeface="+mn-cs"/>
+      </a:defRPr>
+    </a:lvl2pPr>
+    <a:lvl3pPr marL="914400" algn="l" defTabSz="914400" rtl="0" eaLnBrk="1" latinLnBrk="0" hangingPunct="1">
+      <a:defRPr sz="1200" kern="1200">
+        <a:solidFill>
+          <a:schemeClr val="tx1"/>
+        </a:solidFill>
+        <a:latin typeface="+mn-lt"/>
+        <a:ea typeface="+mn-ea"/>
+        <a:cs typeface="+mn-cs"/>
+      </a:defRPr>
+    </a:lvl3pPr>
+    <a:lvl4pPr marL="1371600" algn="l" defTabSz="914400" rtl="0" eaLnBrk="1" latinLnBrk="0" hangingPunct="1">
+      <a:defRPr sz="1200" kern="1200">
+        <a:solidFill>
+          <a:schemeClr val="tx1"/>
+        </a:solidFill>
+        <a:latin typeface="+mn-lt"/>
+        <a:ea typeface="+mn-ea"/>
+        <a:cs typeface="+mn-cs"/>
+      </a:defRPr>
+    </a:lvl4pPr>
+    <a:lvl5pPr marL="1828800" algn="l" defTabSz="914400" rtl="0" eaLnBrk="1" latinLnBrk="0" hangingPunct="1">
+      <a:defRPr sz="1200" kern="1200">
+        <a:solidFill>
+          <a:schemeClr val="tx1"/>
+        </a:solidFill>
+        <a:latin typeface="+mn-lt"/>
+        <a:ea typeface="+mn-ea"/>
+        <a:cs typeface="+mn-cs"/>
+      </a:defRPr>
+    </a:lvl5pPr>
+    <a:lvl6pPr marL="2286000" algn="l" defTabSz="914400" rtl="0" eaLnBrk="1" latinLnBrk="0" hangingPunct="1">
+      <a:defRPr sz="1200" kern="1200">
+        <a:solidFill>
+          <a:schemeClr val="tx1"/>
+        </a:solidFill>
+        <a:latin typeface="+mn-lt"/>
+        <a:ea typeface="+mn-ea"/>
+        <a:cs typeface="+mn-cs"/>
+      </a:defRPr>
+    </a:lvl6pPr>
+    <a:lvl7pPr marL="2743200" algn="l" defTabSz="914400" rtl="0" eaLnBrk="1" latinLnBrk="0" hangingPunct="1">
+      <a:defRPr sz="1200" kern="1200">
+        <a:solidFill>
+          <a:schemeClr val="tx1"/>
+        </a:solidFill>
+        <a:latin typeface="+mn-lt"/>
+        <a:ea typeface="+mn-ea"/>
+        <a:cs typeface="+mn-cs"/>
+      </a:defRPr>
+    </a:lvl7pPr>
+    <a:lvl8pPr marL="3200400" algn="l" defTabSz="914400" rtl="0" eaLnBrk="1" latinLnBrk="0" hangingPunct="1">
+      <a:defRPr sz="1200" kern="1200">
+        <a:solidFill>
+          <a:schemeClr val="tx1"/>
+        </a:solidFill>
+        <a:latin typeface="+mn-lt"/>
+        <a:ea typeface="+mn-ea"/>
+        <a:cs typeface="+mn-cs"/>
+      </a:defRPr>
+    </a:lvl8pPr>
+    <a:lvl9pPr marL="3657600" algn="l" defTabSz="914400" rtl="0" eaLnBrk="1" latinLnBrk="0" hangingPunct="1">
+      <a:defRPr sz="1200" kern="1200">
+        <a:solidFill>
+          <a:schemeClr val="tx1"/>
+        </a:solidFill>
+        <a:latin typeface="+mn-lt"/>
+        <a:ea typeface="+mn-ea"/>
+        <a:cs typeface="+mn-cs"/>
+      </a:defRPr>
+    </a:lvl9pPr>
+  </p:notesStyle>
+</p:notesMaster>
+</file>
+
+<file path=ppt/notesSlides/notesSlide1.xml><?xml version="1.0" encoding="utf-8"?>
+<p:notes xmlns:a="http://schemas.openxmlformats.org/drawingml/2006/main" xmlns:r="http://schemas.openxmlformats.org/officeDocument/2006/relationships" xmlns:p="http://schemas.openxmlformats.org/presentationml/2006/main">
+  <p:cSld>
+    <p:spTree>
+      <p:nvGrpSpPr>
+        <p:cNvPr id="1" name=""/>
+        <p:cNvGrpSpPr/>
+        <p:nvPr/>
+      </p:nvGrpSpPr>
+      <p:grpSpPr>
+        <a:xfrm>
+          <a:off x="0" y="0"/>
+          <a:ext cx="0" cy="0"/>
+          <a:chOff x="0" y="0"/>
+          <a:chExt cx="0" cy="0"/>
+        </a:xfrm>
+      </p:grpSpPr>
+      <p:sp>
+        <p:nvSpPr>
+          <p:cNvPr id="2" name="Slide Image Placeholder 1"/>
+          <p:cNvSpPr>
+            <a:spLocks noGrp="1" noRot="1" noChangeAspect="1"/>
+          </p:cNvSpPr>
+          <p:nvPr>
+            <p:ph type="sldImg"/>
+          </p:nvPr>
+        </p:nvSpPr>
+        <p:spPr/>
+      </p:sp>
+      <p:sp>
+        <p:nvSpPr>
+          <p:cNvPr id="3" name="Notes Placeholder 2"/>
+          <p:cNvSpPr>
+            <a:spLocks noGrp="1"/>
+          </p:cNvSpPr>
+          <p:nvPr>
+            <p:ph type="body" idx="1"/>
+          </p:nvPr>
+        </p:nvSpPr>
+        <p:spPr/>
+        <p:txBody>
+          <a:bodyPr/>
+          <a:lstStyle/>
+          <a:p>
+            <a:endParaRPr lang="en-US"/>
+          </a:p>
+        </p:txBody>
+      </p:sp>
+      <p:sp>
+        <p:nvSpPr>
+          <p:cNvPr id="4" name="Slide Number Placeholder 3"/>
+          <p:cNvSpPr>
+            <a:spLocks noGrp="1"/>
+          </p:cNvSpPr>
+          <p:nvPr>
+            <p:ph type="sldNum" sz="quarter" idx="10"/>
+          </p:nvPr>
+        </p:nvSpPr>
+        <p:spPr/>
+        <p:txBody>
+          <a:bodyPr/>
+          <a:lstStyle/>
+          <a:p>
+            <a:fld id="{2A4B3E60-23B9-4895-BA16-8C2392A23D0E}" type="slidenum">
+              <a:rPr lang="en-US" smtClean="0"/>
+              <a:t>2</a:t>
+            </a:fld>
+            <a:endParaRPr lang="en-US"/>
+          </a:p>
+        </p:txBody>
+      </p:sp>
+    </p:spTree>
+    <p:extLst>
+      <p:ext uri="{BB962C8B-B14F-4D97-AF65-F5344CB8AC3E}">
+        <p14:creationId xmlns:p14="http://schemas.microsoft.com/office/powerpoint/2010/main" val="1262578066"/>
+      </p:ext>
+    </p:extLst>
+  </p:cSld>
+  <p:clrMapOvr>
+    <a:masterClrMapping/>
+  </p:clrMapOvr>
+</p:notes>
+</file>
+
+<file path=ppt/notesSlides/notesSlide2.xml><?xml version="1.0" encoding="utf-8"?>
+<p:notes xmlns:a="http://schemas.openxmlformats.org/drawingml/2006/main" xmlns:r="http://schemas.openxmlformats.org/officeDocument/2006/relationships" xmlns:p="http://schemas.openxmlformats.org/presentationml/2006/main">
+  <p:cSld>
+    <p:spTree>
+      <p:nvGrpSpPr>
+        <p:cNvPr id="1" name=""/>
+        <p:cNvGrpSpPr/>
+        <p:nvPr/>
+      </p:nvGrpSpPr>
+      <p:grpSpPr>
+        <a:xfrm>
+          <a:off x="0" y="0"/>
+          <a:ext cx="0" cy="0"/>
+          <a:chOff x="0" y="0"/>
+          <a:chExt cx="0" cy="0"/>
+        </a:xfrm>
+      </p:grpSpPr>
+      <p:sp>
+        <p:nvSpPr>
+          <p:cNvPr id="2" name="Slide Image Placeholder 1"/>
+          <p:cNvSpPr>
+            <a:spLocks noGrp="1" noRot="1" noChangeAspect="1"/>
+          </p:cNvSpPr>
+          <p:nvPr>
+            <p:ph type="sldImg"/>
+          </p:nvPr>
+        </p:nvSpPr>
+        <p:spPr/>
+      </p:sp>
+      <p:sp>
+        <p:nvSpPr>
+          <p:cNvPr id="3" name="Notes Placeholder 2"/>
+          <p:cNvSpPr>
+            <a:spLocks noGrp="1"/>
+          </p:cNvSpPr>
+          <p:nvPr>
+            <p:ph type="body" idx="1"/>
+          </p:nvPr>
+        </p:nvSpPr>
+        <p:spPr/>
+        <p:txBody>
+          <a:bodyPr/>
+          <a:lstStyle/>
+          <a:p>
+            <a:endParaRPr lang="en-US"/>
+          </a:p>
+        </p:txBody>
+      </p:sp>
+      <p:sp>
+        <p:nvSpPr>
+          <p:cNvPr id="4" name="Slide Number Placeholder 3"/>
+          <p:cNvSpPr>
+            <a:spLocks noGrp="1"/>
+          </p:cNvSpPr>
+          <p:nvPr>
+            <p:ph type="sldNum" sz="quarter" idx="10"/>
+          </p:nvPr>
+        </p:nvSpPr>
+        <p:spPr/>
+        <p:txBody>
+          <a:bodyPr/>
+          <a:lstStyle/>
+          <a:p>
+            <a:fld id="{2A4B3E60-23B9-4895-BA16-8C2392A23D0E}" type="slidenum">
+              <a:rPr lang="en-US" smtClean="0"/>
+              <a:t>3</a:t>
+            </a:fld>
+            <a:endParaRPr lang="en-US"/>
+          </a:p>
+        </p:txBody>
+      </p:sp>
+    </p:spTree>
+    <p:extLst>
+      <p:ext uri="{BB962C8B-B14F-4D97-AF65-F5344CB8AC3E}">
+        <p14:creationId xmlns:p14="http://schemas.microsoft.com/office/powerpoint/2010/main" val="3944582360"/>
+      </p:ext>
+    </p:extLst>
+  </p:cSld>
+  <p:clrMapOvr>
+    <a:masterClrMapping/>
+  </p:clrMapOvr>
+</p:notes>
+</file>
+
+<file path=ppt/notesSlides/notesSlide3.xml><?xml version="1.0" encoding="utf-8"?>
+<p:notes xmlns:a="http://schemas.openxmlformats.org/drawingml/2006/main" xmlns:r="http://schemas.openxmlformats.org/officeDocument/2006/relationships" xmlns:p="http://schemas.openxmlformats.org/presentationml/2006/main">
+  <p:cSld>
+    <p:spTree>
+      <p:nvGrpSpPr>
+        <p:cNvPr id="1" name=""/>
+        <p:cNvGrpSpPr/>
+        <p:nvPr/>
+      </p:nvGrpSpPr>
+      <p:grpSpPr>
+        <a:xfrm>
+          <a:off x="0" y="0"/>
+          <a:ext cx="0" cy="0"/>
+          <a:chOff x="0" y="0"/>
+          <a:chExt cx="0" cy="0"/>
+        </a:xfrm>
+      </p:grpSpPr>
+      <p:sp>
+        <p:nvSpPr>
+          <p:cNvPr id="2" name="Slide Image Placeholder 1"/>
+          <p:cNvSpPr>
+            <a:spLocks noGrp="1" noRot="1" noChangeAspect="1"/>
+          </p:cNvSpPr>
+          <p:nvPr>
+            <p:ph type="sldImg"/>
+          </p:nvPr>
+        </p:nvSpPr>
+        <p:spPr/>
+      </p:sp>
+      <p:sp>
+        <p:nvSpPr>
+          <p:cNvPr id="3" name="Notes Placeholder 2"/>
+          <p:cNvSpPr>
+            <a:spLocks noGrp="1"/>
+          </p:cNvSpPr>
+          <p:nvPr>
+            <p:ph type="body" idx="1"/>
+          </p:nvPr>
+        </p:nvSpPr>
+        <p:spPr/>
+        <p:txBody>
+          <a:bodyPr/>
+          <a:lstStyle/>
+          <a:p>
+            <a:endParaRPr lang="en-US"/>
+          </a:p>
+        </p:txBody>
+      </p:sp>
+      <p:sp>
+        <p:nvSpPr>
+          <p:cNvPr id="4" name="Slide Number Placeholder 3"/>
+          <p:cNvSpPr>
+            <a:spLocks noGrp="1"/>
+          </p:cNvSpPr>
+          <p:nvPr>
+            <p:ph type="sldNum" sz="quarter" idx="10"/>
+          </p:nvPr>
+        </p:nvSpPr>
+        <p:spPr/>
+        <p:txBody>
+          <a:bodyPr/>
+          <a:lstStyle/>
+          <a:p>
+            <a:fld id="{2A4B3E60-23B9-4895-BA16-8C2392A23D0E}" type="slidenum">
+              <a:rPr lang="en-US" smtClean="0"/>
+              <a:t>4</a:t>
+            </a:fld>
+            <a:endParaRPr lang="en-US"/>
+          </a:p>
+        </p:txBody>
+      </p:sp>
+    </p:spTree>
+    <p:extLst>
+      <p:ext uri="{BB962C8B-B14F-4D97-AF65-F5344CB8AC3E}">
+        <p14:creationId xmlns:p14="http://schemas.microsoft.com/office/powerpoint/2010/main" val="530381013"/>
+      </p:ext>
+    </p:extLst>
+  </p:cSld>
+  <p:clrMapOvr>
+    <a:masterClrMapping/>
+  </p:clrMapOvr>
+</p:notes>
+</file>
+
 <file path=ppt/slideLayouts/slideLayout1.xml><?xml version="1.0" encoding="utf-8"?>
 <p:sldLayout xmlns:a="http://schemas.openxmlformats.org/drawingml/2006/main" xmlns:r="http://schemas.openxmlformats.org/officeDocument/2006/relationships" xmlns:p="http://schemas.openxmlformats.org/presentationml/2006/main" type="title" preserve="1">
   <p:cSld name="Title Slide">
@@ -244,7 +851,7 @@
           <a:p>
             <a:fld id="{67967574-EAC9-4726-B126-F1796D4AAC16}" type="datetimeFigureOut">
               <a:rPr lang="en-US" smtClean="0"/>
-              <a:t>11/19/2015</a:t>
+              <a:t>5/12/2016</a:t>
             </a:fld>
             <a:endParaRPr lang="en-US"/>
           </a:p>
@@ -414,7 +1021,7 @@
           <a:p>
             <a:fld id="{67967574-EAC9-4726-B126-F1796D4AAC16}" type="datetimeFigureOut">
               <a:rPr lang="en-US" smtClean="0"/>
-              <a:t>11/19/2015</a:t>
+              <a:t>5/12/2016</a:t>
             </a:fld>
             <a:endParaRPr lang="en-US"/>
           </a:p>
@@ -594,7 +1201,7 @@
           <a:p>
             <a:fld id="{67967574-EAC9-4726-B126-F1796D4AAC16}" type="datetimeFigureOut">
               <a:rPr lang="en-US" smtClean="0"/>
-              <a:t>11/19/2015</a:t>
+              <a:t>5/12/2016</a:t>
             </a:fld>
             <a:endParaRPr lang="en-US"/>
           </a:p>
@@ -764,7 +1371,7 @@
           <a:p>
             <a:fld id="{67967574-EAC9-4726-B126-F1796D4AAC16}" type="datetimeFigureOut">
               <a:rPr lang="en-US" smtClean="0"/>
-              <a:t>11/19/2015</a:t>
+              <a:t>5/12/2016</a:t>
             </a:fld>
             <a:endParaRPr lang="en-US"/>
           </a:p>
@@ -1010,7 +1617,7 @@
           <a:p>
             <a:fld id="{67967574-EAC9-4726-B126-F1796D4AAC16}" type="datetimeFigureOut">
               <a:rPr lang="en-US" smtClean="0"/>
-              <a:t>11/19/2015</a:t>
+              <a:t>5/12/2016</a:t>
             </a:fld>
             <a:endParaRPr lang="en-US"/>
           </a:p>
@@ -1242,7 +1849,7 @@
           <a:p>
             <a:fld id="{67967574-EAC9-4726-B126-F1796D4AAC16}" type="datetimeFigureOut">
               <a:rPr lang="en-US" smtClean="0"/>
-              <a:t>11/19/2015</a:t>
+              <a:t>5/12/2016</a:t>
             </a:fld>
             <a:endParaRPr lang="en-US"/>
           </a:p>
@@ -1609,7 +2216,7 @@
           <a:p>
             <a:fld id="{67967574-EAC9-4726-B126-F1796D4AAC16}" type="datetimeFigureOut">
               <a:rPr lang="en-US" smtClean="0"/>
-              <a:t>11/19/2015</a:t>
+              <a:t>5/12/2016</a:t>
             </a:fld>
             <a:endParaRPr lang="en-US"/>
           </a:p>
@@ -1727,7 +2334,7 @@
           <a:p>
             <a:fld id="{67967574-EAC9-4726-B126-F1796D4AAC16}" type="datetimeFigureOut">
               <a:rPr lang="en-US" smtClean="0"/>
-              <a:t>11/19/2015</a:t>
+              <a:t>5/12/2016</a:t>
             </a:fld>
             <a:endParaRPr lang="en-US"/>
           </a:p>
@@ -1822,7 +2429,7 @@
           <a:p>
             <a:fld id="{67967574-EAC9-4726-B126-F1796D4AAC16}" type="datetimeFigureOut">
               <a:rPr lang="en-US" smtClean="0"/>
-              <a:t>11/19/2015</a:t>
+              <a:t>5/12/2016</a:t>
             </a:fld>
             <a:endParaRPr lang="en-US"/>
           </a:p>
@@ -2099,7 +2706,7 @@
           <a:p>
             <a:fld id="{67967574-EAC9-4726-B126-F1796D4AAC16}" type="datetimeFigureOut">
               <a:rPr lang="en-US" smtClean="0"/>
-              <a:t>11/19/2015</a:t>
+              <a:t>5/12/2016</a:t>
             </a:fld>
             <a:endParaRPr lang="en-US"/>
           </a:p>
@@ -2356,7 +2963,7 @@
           <a:p>
             <a:fld id="{67967574-EAC9-4726-B126-F1796D4AAC16}" type="datetimeFigureOut">
               <a:rPr lang="en-US" smtClean="0"/>
-              <a:t>11/19/2015</a:t>
+              <a:t>5/12/2016</a:t>
             </a:fld>
             <a:endParaRPr lang="en-US"/>
           </a:p>
@@ -2569,7 +3176,7 @@
           <a:p>
             <a:fld id="{67967574-EAC9-4726-B126-F1796D4AAC16}" type="datetimeFigureOut">
               <a:rPr lang="en-US" smtClean="0"/>
-              <a:t>11/19/2015</a:t>
+              <a:t>5/12/2016</a:t>
             </a:fld>
             <a:endParaRPr lang="en-US"/>
           </a:p>
@@ -2982,8 +3589,8 @@
         </p:nvSpPr>
         <p:spPr>
           <a:xfrm>
-            <a:off x="-243682" y="-551845"/>
-            <a:ext cx="10387584" cy="2657651"/>
+            <a:off x="9890" y="-6281"/>
+            <a:ext cx="10387584" cy="3086871"/>
           </a:xfrm>
           <a:prstGeom prst="rect">
             <a:avLst/>
@@ -3081,9 +3688,38 @@
               <a:buChar char="•"/>
             </a:pPr>
             <a:r>
-              <a:rPr lang="en-US" sz="1389" dirty="0"/>
+              <a:rPr lang="en-US" sz="1389" dirty="0" smtClean="0"/>
               <a:t>...</a:t>
             </a:r>
+          </a:p>
+          <a:p>
+            <a:pPr marL="1200026" lvl="2" indent="-285720">
+              <a:buFont typeface="Calibri" panose="020F0502020204030204" pitchFamily="34" charset="0"/>
+              <a:buChar char="•"/>
+            </a:pPr>
+            <a:r>
+              <a:rPr lang="en-US" sz="1400" dirty="0">
+                <a:solidFill>
+                  <a:schemeClr val="accent6"/>
+                </a:solidFill>
+              </a:rPr>
+              <a:t>+</a:t>
+            </a:r>
+            <a:r>
+              <a:rPr lang="en-US" sz="1400" i="1" dirty="0">
+                <a:solidFill>
+                  <a:schemeClr val="accent6"/>
+                </a:solidFill>
+              </a:rPr>
+              <a:t> Correctly identifies input that causes the branch to execute</a:t>
+            </a:r>
+          </a:p>
+          <a:p>
+            <a:pPr marL="1200026" lvl="2" indent="-285720">
+              <a:buFont typeface="Calibri" panose="020F0502020204030204" pitchFamily="34" charset="0"/>
+              <a:buChar char="•"/>
+            </a:pPr>
+            <a:endParaRPr lang="en-US" sz="1389" dirty="0"/>
           </a:p>
           <a:p>
             <a:pPr marL="742873" lvl="1" indent="-285720">
@@ -3131,6 +3767,13 @@
       <p:transition spd="slow"/>
     </mc:Fallback>
   </mc:AlternateContent>
+  <p:timing>
+    <p:tnLst>
+      <p:par>
+        <p:cTn id="1" dur="indefinite" restart="never" nodeType="tmRoot"/>
+      </p:par>
+    </p:tnLst>
+  </p:timing>
 </p:sld>
 </file>
 
@@ -3184,15 +3827,7 @@
             </a:pPr>
             <a:r>
               <a:rPr lang="en-US" sz="2800" dirty="0" smtClean="0"/>
-              <a:t>Participant 1: Resolve </a:t>
-            </a:r>
-            <a:r>
-              <a:rPr lang="en-US" sz="2800" dirty="0" err="1" smtClean="0"/>
-              <a:t>FindBugs</a:t>
-            </a:r>
-            <a:r>
-              <a:rPr lang="en-US" sz="2800" dirty="0" smtClean="0"/>
-              <a:t> NPE defect</a:t>
+              <a:t>Participant 1: Resolve FindBugs NPE defect</a:t>
             </a:r>
             <a:endParaRPr lang="en-US" sz="2800" dirty="0"/>
           </a:p>
@@ -3740,6 +4375,1257 @@
   <p:clrMapOvr>
     <a:masterClrMapping/>
   </p:clrMapOvr>
+  <p:timing>
+    <p:tnLst>
+      <p:par>
+        <p:cTn id="1" dur="indefinite" restart="never" nodeType="tmRoot"/>
+      </p:par>
+    </p:tnLst>
+  </p:timing>
+</p:sld>
+</file>
+
+<file path=ppt/slides/slide3.xml><?xml version="1.0" encoding="utf-8"?>
+<p:sld xmlns:a="http://schemas.openxmlformats.org/drawingml/2006/main" xmlns:r="http://schemas.openxmlformats.org/officeDocument/2006/relationships" xmlns:p="http://schemas.openxmlformats.org/presentationml/2006/main">
+  <p:cSld>
+    <p:spTree>
+      <p:nvGrpSpPr>
+        <p:cNvPr id="1" name=""/>
+        <p:cNvGrpSpPr/>
+        <p:nvPr/>
+      </p:nvGrpSpPr>
+      <p:grpSpPr>
+        <a:xfrm>
+          <a:off x="0" y="0"/>
+          <a:ext cx="0" cy="0"/>
+          <a:chOff x="0" y="0"/>
+          <a:chExt cx="0" cy="0"/>
+        </a:xfrm>
+      </p:grpSpPr>
+      <p:sp>
+        <p:nvSpPr>
+          <p:cNvPr id="4" name="TextBox 3"/>
+          <p:cNvSpPr txBox="1"/>
+          <p:nvPr/>
+        </p:nvSpPr>
+        <p:spPr>
+          <a:xfrm>
+            <a:off x="141328" y="-32078"/>
+            <a:ext cx="9875520" cy="4832092"/>
+          </a:xfrm>
+          <a:prstGeom prst="rect">
+            <a:avLst/>
+          </a:prstGeom>
+          <a:noFill/>
+          <a:ln>
+            <a:solidFill>
+              <a:schemeClr val="bg1"/>
+            </a:solidFill>
+          </a:ln>
+        </p:spPr>
+        <p:txBody>
+          <a:bodyPr wrap="square" rtlCol="0">
+            <a:spAutoFit/>
+          </a:bodyPr>
+          <a:lstStyle/>
+          <a:p>
+            <a:pPr marL="285720" indent="-285720">
+              <a:buFont typeface="Calibri" panose="020F0502020204030204" pitchFamily="34" charset="0"/>
+              <a:buChar char="•"/>
+            </a:pPr>
+            <a:r>
+              <a:rPr lang="en-US" sz="2800" dirty="0" smtClean="0"/>
+              <a:t>Participant 1: Resolve FindBugs SQL Injection Defect</a:t>
+            </a:r>
+            <a:endParaRPr lang="en-US" sz="2800" dirty="0"/>
+          </a:p>
+          <a:p>
+            <a:pPr marL="742873" lvl="1" indent="-285720">
+              <a:buFont typeface="Calibri" panose="020F0502020204030204" pitchFamily="34" charset="0"/>
+              <a:buChar char="•"/>
+            </a:pPr>
+            <a:r>
+              <a:rPr lang="en-US" sz="2800" dirty="0" smtClean="0"/>
+              <a:t>Search web for definition of SQL injection</a:t>
+            </a:r>
+            <a:endParaRPr lang="en-US" sz="2800" dirty="0"/>
+          </a:p>
+          <a:p>
+            <a:pPr marL="1200026" lvl="2" indent="-285720">
+              <a:buFont typeface="Calibri" panose="020F0502020204030204" pitchFamily="34" charset="0"/>
+              <a:buChar char="•"/>
+            </a:pPr>
+            <a:r>
+              <a:rPr lang="en-US" sz="2800" dirty="0"/>
+              <a:t>Open the web browser</a:t>
+            </a:r>
+          </a:p>
+          <a:p>
+            <a:pPr marL="1200026" lvl="2" indent="-285720">
+              <a:buFont typeface="Calibri" panose="020F0502020204030204" pitchFamily="34" charset="0"/>
+              <a:buChar char="•"/>
+            </a:pPr>
+            <a:r>
+              <a:rPr lang="en-US" sz="2800" dirty="0"/>
+              <a:t>...</a:t>
+            </a:r>
+          </a:p>
+          <a:p>
+            <a:pPr marL="742873" lvl="1" indent="-285720">
+              <a:buFont typeface="Calibri" panose="020F0502020204030204" pitchFamily="34" charset="0"/>
+              <a:buChar char="•"/>
+            </a:pPr>
+            <a:r>
+              <a:rPr lang="en-US" sz="2800" dirty="0" smtClean="0"/>
+              <a:t>Find examples of </a:t>
+            </a:r>
+            <a:r>
+              <a:rPr lang="en-US" sz="2800" i="1" dirty="0" smtClean="0"/>
+              <a:t>Prepared Statements</a:t>
+            </a:r>
+            <a:endParaRPr lang="en-US" sz="2800" i="1" dirty="0"/>
+          </a:p>
+          <a:p>
+            <a:pPr marL="1200026" lvl="2" indent="-285720">
+              <a:buFont typeface="Calibri" panose="020F0502020204030204" pitchFamily="34" charset="0"/>
+              <a:buChar char="•"/>
+            </a:pPr>
+            <a:r>
+              <a:rPr lang="en-US" sz="2800" dirty="0"/>
+              <a:t>Use </a:t>
+            </a:r>
+            <a:r>
+              <a:rPr lang="en-US" sz="2800" dirty="0" smtClean="0"/>
+              <a:t>`Search’ to locate code in the current project</a:t>
+            </a:r>
+            <a:endParaRPr lang="en-US" sz="2800" dirty="0"/>
+          </a:p>
+          <a:p>
+            <a:pPr marL="1200026" lvl="2" indent="-285720">
+              <a:buFont typeface="Calibri" panose="020F0502020204030204" pitchFamily="34" charset="0"/>
+              <a:buChar char="•"/>
+            </a:pPr>
+            <a:r>
+              <a:rPr lang="en-US" sz="2800" dirty="0"/>
+              <a:t>...</a:t>
+            </a:r>
+          </a:p>
+          <a:p>
+            <a:pPr lvl="2"/>
+            <a:r>
+              <a:rPr lang="en-US" sz="2800" dirty="0">
+                <a:solidFill>
+                  <a:schemeClr val="accent6"/>
+                </a:solidFill>
+              </a:rPr>
+              <a:t>+</a:t>
+            </a:r>
+            <a:r>
+              <a:rPr lang="en-US" sz="2800" i="1" dirty="0">
+                <a:solidFill>
+                  <a:schemeClr val="accent6"/>
+                </a:solidFill>
+              </a:rPr>
+              <a:t> </a:t>
+            </a:r>
+            <a:r>
+              <a:rPr lang="en-US" sz="2800" i="1" dirty="0" smtClean="0">
+                <a:solidFill>
+                  <a:schemeClr val="accent6"/>
+                </a:solidFill>
+              </a:rPr>
+              <a:t>Locates a correct example</a:t>
+            </a:r>
+            <a:endParaRPr lang="en-US" sz="2800" i="1" dirty="0">
+              <a:solidFill>
+                <a:schemeClr val="accent6"/>
+              </a:solidFill>
+            </a:endParaRPr>
+          </a:p>
+          <a:p>
+            <a:pPr marL="742873" lvl="1" indent="-285720">
+              <a:buFont typeface="Arial" panose="020B0604020202020204" pitchFamily="34" charset="0"/>
+              <a:buChar char="•"/>
+            </a:pPr>
+            <a:r>
+              <a:rPr lang="en-US" sz="2800" dirty="0" smtClean="0"/>
+              <a:t>Modify the code</a:t>
+            </a:r>
+            <a:endParaRPr lang="en-US" sz="2800" dirty="0"/>
+          </a:p>
+          <a:p>
+            <a:pPr marL="1200026" lvl="2" indent="-285720">
+              <a:buFont typeface="Arial" panose="020B0604020202020204" pitchFamily="34" charset="0"/>
+              <a:buChar char="•"/>
+            </a:pPr>
+            <a:r>
+              <a:rPr lang="en-US" sz="2800" dirty="0" smtClean="0"/>
+              <a:t>Refactor the code to use </a:t>
+            </a:r>
+            <a:r>
+              <a:rPr lang="en-US" sz="2800" i="1" dirty="0" smtClean="0"/>
+              <a:t>Prepared Statements</a:t>
+            </a:r>
+            <a:endParaRPr lang="en-US" sz="2800" i="1" dirty="0"/>
+          </a:p>
+          <a:p>
+            <a:pPr lvl="2"/>
+            <a:r>
+              <a:rPr lang="en-US" sz="2800" b="1" dirty="0">
+                <a:solidFill>
+                  <a:srgbClr val="C00000"/>
+                </a:solidFill>
+              </a:rPr>
+              <a:t>−</a:t>
+            </a:r>
+            <a:r>
+              <a:rPr lang="en-US" sz="2800" i="1" dirty="0" smtClean="0">
+                <a:solidFill>
+                  <a:srgbClr val="C00000"/>
+                </a:solidFill>
+              </a:rPr>
+              <a:t> </a:t>
+            </a:r>
+            <a:r>
+              <a:rPr lang="en-US" sz="2800" i="1" dirty="0">
+                <a:solidFill>
+                  <a:srgbClr val="C00000"/>
+                </a:solidFill>
+              </a:rPr>
+              <a:t>Code modification introduces a compilation error</a:t>
+            </a:r>
+          </a:p>
+        </p:txBody>
+      </p:sp>
+      <p:cxnSp>
+        <p:nvCxnSpPr>
+          <p:cNvPr id="11" name="Straight Arrow Connector 10"/>
+          <p:cNvCxnSpPr/>
+          <p:nvPr/>
+        </p:nvCxnSpPr>
+        <p:spPr>
+          <a:xfrm>
+            <a:off x="287633" y="656007"/>
+            <a:ext cx="438913" cy="0"/>
+          </a:xfrm>
+          <a:prstGeom prst="straightConnector1">
+            <a:avLst/>
+          </a:prstGeom>
+          <a:ln w="28575">
+            <a:tailEnd type="triangle"/>
+          </a:ln>
+        </p:spPr>
+        <p:style>
+          <a:lnRef idx="1">
+            <a:schemeClr val="dk1"/>
+          </a:lnRef>
+          <a:fillRef idx="0">
+            <a:schemeClr val="dk1"/>
+          </a:fillRef>
+          <a:effectRef idx="0">
+            <a:schemeClr val="dk1"/>
+          </a:effectRef>
+          <a:fontRef idx="minor">
+            <a:schemeClr val="tx1"/>
+          </a:fontRef>
+        </p:style>
+      </p:cxnSp>
+      <p:cxnSp>
+        <p:nvCxnSpPr>
+          <p:cNvPr id="12" name="Straight Arrow Connector 11"/>
+          <p:cNvCxnSpPr/>
+          <p:nvPr/>
+        </p:nvCxnSpPr>
+        <p:spPr>
+          <a:xfrm>
+            <a:off x="289157" y="3631617"/>
+            <a:ext cx="438913" cy="0"/>
+          </a:xfrm>
+          <a:prstGeom prst="straightConnector1">
+            <a:avLst/>
+          </a:prstGeom>
+          <a:ln w="28575">
+            <a:tailEnd type="triangle"/>
+          </a:ln>
+        </p:spPr>
+        <p:style>
+          <a:lnRef idx="1">
+            <a:schemeClr val="dk1"/>
+          </a:lnRef>
+          <a:fillRef idx="0">
+            <a:schemeClr val="dk1"/>
+          </a:fillRef>
+          <a:effectRef idx="0">
+            <a:schemeClr val="dk1"/>
+          </a:effectRef>
+          <a:fontRef idx="minor">
+            <a:schemeClr val="tx1"/>
+          </a:fontRef>
+        </p:style>
+      </p:cxnSp>
+      <p:cxnSp>
+        <p:nvCxnSpPr>
+          <p:cNvPr id="13" name="Straight Arrow Connector 12"/>
+          <p:cNvCxnSpPr/>
+          <p:nvPr/>
+        </p:nvCxnSpPr>
+        <p:spPr>
+          <a:xfrm>
+            <a:off x="287633" y="1930834"/>
+            <a:ext cx="438913" cy="0"/>
+          </a:xfrm>
+          <a:prstGeom prst="straightConnector1">
+            <a:avLst/>
+          </a:prstGeom>
+          <a:ln w="28575">
+            <a:tailEnd type="triangle"/>
+          </a:ln>
+        </p:spPr>
+        <p:style>
+          <a:lnRef idx="1">
+            <a:schemeClr val="dk1"/>
+          </a:lnRef>
+          <a:fillRef idx="0">
+            <a:schemeClr val="dk1"/>
+          </a:fillRef>
+          <a:effectRef idx="0">
+            <a:schemeClr val="dk1"/>
+          </a:effectRef>
+          <a:fontRef idx="minor">
+            <a:schemeClr val="tx1"/>
+          </a:fontRef>
+        </p:style>
+      </p:cxnSp>
+      <p:cxnSp>
+        <p:nvCxnSpPr>
+          <p:cNvPr id="20" name="Straight Connector 19"/>
+          <p:cNvCxnSpPr/>
+          <p:nvPr/>
+        </p:nvCxnSpPr>
+        <p:spPr>
+          <a:xfrm>
+            <a:off x="300587" y="268150"/>
+            <a:ext cx="0" cy="3363467"/>
+          </a:xfrm>
+          <a:prstGeom prst="line">
+            <a:avLst/>
+          </a:prstGeom>
+          <a:ln w="28575"/>
+        </p:spPr>
+        <p:style>
+          <a:lnRef idx="1">
+            <a:schemeClr val="dk1"/>
+          </a:lnRef>
+          <a:fillRef idx="0">
+            <a:schemeClr val="dk1"/>
+          </a:fillRef>
+          <a:effectRef idx="0">
+            <a:schemeClr val="dk1"/>
+          </a:effectRef>
+          <a:fontRef idx="minor">
+            <a:schemeClr val="tx1"/>
+          </a:fontRef>
+        </p:style>
+      </p:cxnSp>
+      <p:cxnSp>
+        <p:nvCxnSpPr>
+          <p:cNvPr id="21" name="Straight Connector 20"/>
+          <p:cNvCxnSpPr/>
+          <p:nvPr/>
+        </p:nvCxnSpPr>
+        <p:spPr>
+          <a:xfrm flipH="1">
+            <a:off x="750929" y="656008"/>
+            <a:ext cx="0" cy="859537"/>
+          </a:xfrm>
+          <a:prstGeom prst="line">
+            <a:avLst/>
+          </a:prstGeom>
+          <a:ln w="28575"/>
+        </p:spPr>
+        <p:style>
+          <a:lnRef idx="1">
+            <a:schemeClr val="dk1"/>
+          </a:lnRef>
+          <a:fillRef idx="0">
+            <a:schemeClr val="dk1"/>
+          </a:fillRef>
+          <a:effectRef idx="0">
+            <a:schemeClr val="dk1"/>
+          </a:effectRef>
+          <a:fontRef idx="minor">
+            <a:schemeClr val="tx1"/>
+          </a:fontRef>
+        </p:style>
+      </p:cxnSp>
+      <p:cxnSp>
+        <p:nvCxnSpPr>
+          <p:cNvPr id="23" name="Straight Connector 22"/>
+          <p:cNvCxnSpPr/>
+          <p:nvPr/>
+        </p:nvCxnSpPr>
+        <p:spPr>
+          <a:xfrm>
+            <a:off x="775313" y="1926767"/>
+            <a:ext cx="0" cy="870967"/>
+          </a:xfrm>
+          <a:prstGeom prst="line">
+            <a:avLst/>
+          </a:prstGeom>
+          <a:ln w="28575"/>
+        </p:spPr>
+        <p:style>
+          <a:lnRef idx="1">
+            <a:schemeClr val="dk1"/>
+          </a:lnRef>
+          <a:fillRef idx="0">
+            <a:schemeClr val="dk1"/>
+          </a:fillRef>
+          <a:effectRef idx="0">
+            <a:schemeClr val="dk1"/>
+          </a:effectRef>
+          <a:fontRef idx="minor">
+            <a:schemeClr val="tx1"/>
+          </a:fontRef>
+        </p:style>
+      </p:cxnSp>
+      <p:cxnSp>
+        <p:nvCxnSpPr>
+          <p:cNvPr id="24" name="Straight Connector 23"/>
+          <p:cNvCxnSpPr/>
+          <p:nvPr/>
+        </p:nvCxnSpPr>
+        <p:spPr>
+          <a:xfrm flipH="1">
+            <a:off x="757026" y="3631617"/>
+            <a:ext cx="0" cy="434084"/>
+          </a:xfrm>
+          <a:prstGeom prst="line">
+            <a:avLst/>
+          </a:prstGeom>
+          <a:ln w="28575"/>
+        </p:spPr>
+        <p:style>
+          <a:lnRef idx="1">
+            <a:schemeClr val="dk1"/>
+          </a:lnRef>
+          <a:fillRef idx="0">
+            <a:schemeClr val="dk1"/>
+          </a:fillRef>
+          <a:effectRef idx="0">
+            <a:schemeClr val="dk1"/>
+          </a:effectRef>
+          <a:fontRef idx="minor">
+            <a:schemeClr val="tx1"/>
+          </a:fontRef>
+        </p:style>
+      </p:cxnSp>
+      <p:cxnSp>
+        <p:nvCxnSpPr>
+          <p:cNvPr id="25" name="Straight Arrow Connector 24"/>
+          <p:cNvCxnSpPr/>
+          <p:nvPr/>
+        </p:nvCxnSpPr>
+        <p:spPr>
+          <a:xfrm>
+            <a:off x="744834" y="1076631"/>
+            <a:ext cx="438913" cy="0"/>
+          </a:xfrm>
+          <a:prstGeom prst="straightConnector1">
+            <a:avLst/>
+          </a:prstGeom>
+          <a:ln w="28575">
+            <a:tailEnd type="triangle"/>
+          </a:ln>
+        </p:spPr>
+        <p:style>
+          <a:lnRef idx="1">
+            <a:schemeClr val="dk1"/>
+          </a:lnRef>
+          <a:fillRef idx="0">
+            <a:schemeClr val="dk1"/>
+          </a:fillRef>
+          <a:effectRef idx="0">
+            <a:schemeClr val="dk1"/>
+          </a:effectRef>
+          <a:fontRef idx="minor">
+            <a:schemeClr val="tx1"/>
+          </a:fontRef>
+        </p:style>
+      </p:cxnSp>
+      <p:cxnSp>
+        <p:nvCxnSpPr>
+          <p:cNvPr id="26" name="Straight Arrow Connector 25"/>
+          <p:cNvCxnSpPr/>
+          <p:nvPr/>
+        </p:nvCxnSpPr>
+        <p:spPr>
+          <a:xfrm>
+            <a:off x="757025" y="1515543"/>
+            <a:ext cx="438913" cy="0"/>
+          </a:xfrm>
+          <a:prstGeom prst="straightConnector1">
+            <a:avLst/>
+          </a:prstGeom>
+          <a:ln w="28575">
+            <a:tailEnd type="triangle"/>
+          </a:ln>
+        </p:spPr>
+        <p:style>
+          <a:lnRef idx="1">
+            <a:schemeClr val="dk1"/>
+          </a:lnRef>
+          <a:fillRef idx="0">
+            <a:schemeClr val="dk1"/>
+          </a:fillRef>
+          <a:effectRef idx="0">
+            <a:schemeClr val="dk1"/>
+          </a:effectRef>
+          <a:fontRef idx="minor">
+            <a:schemeClr val="tx1"/>
+          </a:fontRef>
+        </p:style>
+      </p:cxnSp>
+      <p:cxnSp>
+        <p:nvCxnSpPr>
+          <p:cNvPr id="27" name="Straight Arrow Connector 26"/>
+          <p:cNvCxnSpPr/>
+          <p:nvPr/>
+        </p:nvCxnSpPr>
+        <p:spPr>
+          <a:xfrm>
+            <a:off x="793601" y="2340533"/>
+            <a:ext cx="438913" cy="0"/>
+          </a:xfrm>
+          <a:prstGeom prst="straightConnector1">
+            <a:avLst/>
+          </a:prstGeom>
+          <a:ln w="28575">
+            <a:tailEnd type="triangle"/>
+          </a:ln>
+        </p:spPr>
+        <p:style>
+          <a:lnRef idx="1">
+            <a:schemeClr val="dk1"/>
+          </a:lnRef>
+          <a:fillRef idx="0">
+            <a:schemeClr val="dk1"/>
+          </a:fillRef>
+          <a:effectRef idx="0">
+            <a:schemeClr val="dk1"/>
+          </a:effectRef>
+          <a:fontRef idx="minor">
+            <a:schemeClr val="tx1"/>
+          </a:fontRef>
+        </p:style>
+      </p:cxnSp>
+      <p:cxnSp>
+        <p:nvCxnSpPr>
+          <p:cNvPr id="28" name="Straight Arrow Connector 27"/>
+          <p:cNvCxnSpPr/>
+          <p:nvPr/>
+        </p:nvCxnSpPr>
+        <p:spPr>
+          <a:xfrm>
+            <a:off x="775314" y="2797733"/>
+            <a:ext cx="438913" cy="0"/>
+          </a:xfrm>
+          <a:prstGeom prst="straightConnector1">
+            <a:avLst/>
+          </a:prstGeom>
+          <a:ln w="28575">
+            <a:tailEnd type="triangle"/>
+          </a:ln>
+        </p:spPr>
+        <p:style>
+          <a:lnRef idx="1">
+            <a:schemeClr val="dk1"/>
+          </a:lnRef>
+          <a:fillRef idx="0">
+            <a:schemeClr val="dk1"/>
+          </a:fillRef>
+          <a:effectRef idx="0">
+            <a:schemeClr val="dk1"/>
+          </a:effectRef>
+          <a:fontRef idx="minor">
+            <a:schemeClr val="tx1"/>
+          </a:fontRef>
+        </p:style>
+      </p:cxnSp>
+      <p:cxnSp>
+        <p:nvCxnSpPr>
+          <p:cNvPr id="29" name="Straight Arrow Connector 28"/>
+          <p:cNvCxnSpPr/>
+          <p:nvPr/>
+        </p:nvCxnSpPr>
+        <p:spPr>
+          <a:xfrm>
+            <a:off x="750929" y="4065701"/>
+            <a:ext cx="438913" cy="0"/>
+          </a:xfrm>
+          <a:prstGeom prst="straightConnector1">
+            <a:avLst/>
+          </a:prstGeom>
+          <a:ln w="28575">
+            <a:tailEnd type="triangle"/>
+          </a:ln>
+        </p:spPr>
+        <p:style>
+          <a:lnRef idx="1">
+            <a:schemeClr val="dk1"/>
+          </a:lnRef>
+          <a:fillRef idx="0">
+            <a:schemeClr val="dk1"/>
+          </a:fillRef>
+          <a:effectRef idx="0">
+            <a:schemeClr val="dk1"/>
+          </a:effectRef>
+          <a:fontRef idx="minor">
+            <a:schemeClr val="tx1"/>
+          </a:fontRef>
+        </p:style>
+      </p:cxnSp>
+    </p:spTree>
+    <p:extLst>
+      <p:ext uri="{BB962C8B-B14F-4D97-AF65-F5344CB8AC3E}">
+        <p14:creationId xmlns:p14="http://schemas.microsoft.com/office/powerpoint/2010/main" val="10944633"/>
+      </p:ext>
+    </p:extLst>
+  </p:cSld>
+  <p:clrMapOvr>
+    <a:masterClrMapping/>
+  </p:clrMapOvr>
+  <p:timing>
+    <p:tnLst>
+      <p:par>
+        <p:cTn id="1" dur="indefinite" restart="never" nodeType="tmRoot"/>
+      </p:par>
+    </p:tnLst>
+  </p:timing>
+</p:sld>
+</file>
+
+<file path=ppt/slides/slide4.xml><?xml version="1.0" encoding="utf-8"?>
+<p:sld xmlns:a="http://schemas.openxmlformats.org/drawingml/2006/main" xmlns:r="http://schemas.openxmlformats.org/officeDocument/2006/relationships" xmlns:p="http://schemas.openxmlformats.org/presentationml/2006/main">
+  <p:cSld>
+    <p:spTree>
+      <p:nvGrpSpPr>
+        <p:cNvPr id="1" name=""/>
+        <p:cNvGrpSpPr/>
+        <p:nvPr/>
+      </p:nvGrpSpPr>
+      <p:grpSpPr>
+        <a:xfrm>
+          <a:off x="0" y="0"/>
+          <a:ext cx="0" cy="0"/>
+          <a:chOff x="0" y="0"/>
+          <a:chExt cx="0" cy="0"/>
+        </a:xfrm>
+      </p:grpSpPr>
+      <p:sp>
+        <p:nvSpPr>
+          <p:cNvPr id="4" name="TextBox 3"/>
+          <p:cNvSpPr txBox="1"/>
+          <p:nvPr/>
+        </p:nvSpPr>
+        <p:spPr>
+          <a:xfrm>
+            <a:off x="141328" y="-32078"/>
+            <a:ext cx="8602622" cy="4832092"/>
+          </a:xfrm>
+          <a:prstGeom prst="rect">
+            <a:avLst/>
+          </a:prstGeom>
+          <a:noFill/>
+          <a:ln>
+            <a:solidFill>
+              <a:schemeClr val="bg1"/>
+            </a:solidFill>
+          </a:ln>
+        </p:spPr>
+        <p:txBody>
+          <a:bodyPr wrap="square" rtlCol="0">
+            <a:spAutoFit/>
+          </a:bodyPr>
+          <a:lstStyle/>
+          <a:p>
+            <a:pPr marL="285720" indent="-285720">
+              <a:buFont typeface="Calibri" panose="020F0502020204030204" pitchFamily="34" charset="0"/>
+              <a:buChar char="•"/>
+            </a:pPr>
+            <a:r>
+              <a:rPr lang="en-US" sz="2800" dirty="0" smtClean="0"/>
+              <a:t>Participant 1: Resolve FindBugs Path Traversal Defect</a:t>
+            </a:r>
+            <a:endParaRPr lang="en-US" sz="2800" dirty="0"/>
+          </a:p>
+          <a:p>
+            <a:pPr marL="742873" lvl="1" indent="-285720">
+              <a:buFont typeface="Calibri" panose="020F0502020204030204" pitchFamily="34" charset="0"/>
+              <a:buChar char="•"/>
+            </a:pPr>
+            <a:r>
+              <a:rPr lang="en-US" sz="2800" dirty="0" smtClean="0"/>
+              <a:t>Search web for definition of Path Traversal</a:t>
+            </a:r>
+            <a:endParaRPr lang="en-US" sz="2800" dirty="0"/>
+          </a:p>
+          <a:p>
+            <a:pPr marL="1200026" lvl="2" indent="-285720">
+              <a:buFont typeface="Calibri" panose="020F0502020204030204" pitchFamily="34" charset="0"/>
+              <a:buChar char="•"/>
+            </a:pPr>
+            <a:r>
+              <a:rPr lang="en-US" sz="2800" dirty="0"/>
+              <a:t>Open the web browser</a:t>
+            </a:r>
+          </a:p>
+          <a:p>
+            <a:pPr marL="1200026" lvl="2" indent="-285720">
+              <a:buFont typeface="Calibri" panose="020F0502020204030204" pitchFamily="34" charset="0"/>
+              <a:buChar char="•"/>
+            </a:pPr>
+            <a:r>
+              <a:rPr lang="en-US" sz="2800" dirty="0"/>
+              <a:t>...</a:t>
+            </a:r>
+          </a:p>
+          <a:p>
+            <a:pPr marL="742873" lvl="1" indent="-285720">
+              <a:buFont typeface="Calibri" panose="020F0502020204030204" pitchFamily="34" charset="0"/>
+              <a:buChar char="•"/>
+            </a:pPr>
+            <a:r>
+              <a:rPr lang="en-US" sz="2800" dirty="0" smtClean="0"/>
+              <a:t>Find examples of path sanitization methods</a:t>
+            </a:r>
+            <a:r>
+              <a:rPr lang="en-US" sz="2800" i="1" dirty="0" smtClean="0"/>
+              <a:t> </a:t>
+            </a:r>
+            <a:endParaRPr lang="en-US" sz="2800" i="1" dirty="0"/>
+          </a:p>
+          <a:p>
+            <a:pPr marL="1200026" lvl="2" indent="-285720">
+              <a:buFont typeface="Calibri" panose="020F0502020204030204" pitchFamily="34" charset="0"/>
+              <a:buChar char="•"/>
+            </a:pPr>
+            <a:r>
+              <a:rPr lang="en-US" sz="2800" dirty="0"/>
+              <a:t>Use </a:t>
+            </a:r>
+            <a:r>
+              <a:rPr lang="en-US" sz="2800" dirty="0" smtClean="0"/>
+              <a:t>`Search’ to locate code in the current project</a:t>
+            </a:r>
+            <a:endParaRPr lang="en-US" sz="2800" dirty="0"/>
+          </a:p>
+          <a:p>
+            <a:pPr marL="1200026" lvl="2" indent="-285720">
+              <a:buFont typeface="Calibri" panose="020F0502020204030204" pitchFamily="34" charset="0"/>
+              <a:buChar char="•"/>
+            </a:pPr>
+            <a:r>
+              <a:rPr lang="en-US" sz="2800" dirty="0"/>
+              <a:t>...</a:t>
+            </a:r>
+          </a:p>
+          <a:p>
+            <a:pPr lvl="2"/>
+            <a:r>
+              <a:rPr lang="en-US" sz="2800" dirty="0">
+                <a:solidFill>
+                  <a:schemeClr val="accent6"/>
+                </a:solidFill>
+              </a:rPr>
+              <a:t>+</a:t>
+            </a:r>
+            <a:r>
+              <a:rPr lang="en-US" sz="2800" i="1" dirty="0">
+                <a:solidFill>
+                  <a:schemeClr val="accent6"/>
+                </a:solidFill>
+              </a:rPr>
+              <a:t> </a:t>
+            </a:r>
+            <a:r>
+              <a:rPr lang="en-US" sz="2800" i="1" dirty="0" smtClean="0">
+                <a:solidFill>
+                  <a:schemeClr val="accent6"/>
+                </a:solidFill>
+              </a:rPr>
+              <a:t>Locates a correct example</a:t>
+            </a:r>
+            <a:endParaRPr lang="en-US" sz="2800" i="1" dirty="0">
+              <a:solidFill>
+                <a:schemeClr val="accent6"/>
+              </a:solidFill>
+            </a:endParaRPr>
+          </a:p>
+          <a:p>
+            <a:pPr marL="742873" lvl="1" indent="-285720">
+              <a:buFont typeface="Arial" panose="020B0604020202020204" pitchFamily="34" charset="0"/>
+              <a:buChar char="•"/>
+            </a:pPr>
+            <a:r>
+              <a:rPr lang="en-US" sz="2800" dirty="0" smtClean="0"/>
+              <a:t>Modify the code</a:t>
+            </a:r>
+            <a:endParaRPr lang="en-US" sz="2800" dirty="0"/>
+          </a:p>
+          <a:p>
+            <a:pPr marL="1200026" lvl="2" indent="-285720">
+              <a:buFont typeface="Arial" panose="020B0604020202020204" pitchFamily="34" charset="0"/>
+              <a:buChar char="•"/>
+            </a:pPr>
+            <a:r>
+              <a:rPr lang="en-US" sz="2800" dirty="0" smtClean="0"/>
+              <a:t>Refactor the </a:t>
+            </a:r>
+            <a:r>
+              <a:rPr lang="en-US" sz="2800" dirty="0" smtClean="0"/>
+              <a:t>code to </a:t>
+            </a:r>
+            <a:r>
+              <a:rPr lang="en-US" sz="2800" dirty="0" smtClean="0"/>
+              <a:t>sanitize the path</a:t>
+            </a:r>
+            <a:endParaRPr lang="en-US" sz="2800" i="1" dirty="0"/>
+          </a:p>
+          <a:p>
+            <a:pPr lvl="2"/>
+            <a:r>
+              <a:rPr lang="en-US" sz="2800" b="1" dirty="0">
+                <a:solidFill>
+                  <a:srgbClr val="C00000"/>
+                </a:solidFill>
+              </a:rPr>
+              <a:t>−</a:t>
+            </a:r>
+            <a:r>
+              <a:rPr lang="en-US" sz="2800" i="1" dirty="0" smtClean="0">
+                <a:solidFill>
+                  <a:srgbClr val="C00000"/>
+                </a:solidFill>
+              </a:rPr>
+              <a:t> </a:t>
+            </a:r>
+            <a:r>
+              <a:rPr lang="en-US" sz="2800" i="1" dirty="0">
+                <a:solidFill>
+                  <a:srgbClr val="C00000"/>
+                </a:solidFill>
+              </a:rPr>
+              <a:t>Code modification introduces a compilation error</a:t>
+            </a:r>
+          </a:p>
+        </p:txBody>
+      </p:sp>
+      <p:cxnSp>
+        <p:nvCxnSpPr>
+          <p:cNvPr id="11" name="Straight Arrow Connector 10"/>
+          <p:cNvCxnSpPr/>
+          <p:nvPr/>
+        </p:nvCxnSpPr>
+        <p:spPr>
+          <a:xfrm>
+            <a:off x="287633" y="656007"/>
+            <a:ext cx="438913" cy="0"/>
+          </a:xfrm>
+          <a:prstGeom prst="straightConnector1">
+            <a:avLst/>
+          </a:prstGeom>
+          <a:ln w="28575">
+            <a:tailEnd type="triangle"/>
+          </a:ln>
+        </p:spPr>
+        <p:style>
+          <a:lnRef idx="1">
+            <a:schemeClr val="dk1"/>
+          </a:lnRef>
+          <a:fillRef idx="0">
+            <a:schemeClr val="dk1"/>
+          </a:fillRef>
+          <a:effectRef idx="0">
+            <a:schemeClr val="dk1"/>
+          </a:effectRef>
+          <a:fontRef idx="minor">
+            <a:schemeClr val="tx1"/>
+          </a:fontRef>
+        </p:style>
+      </p:cxnSp>
+      <p:cxnSp>
+        <p:nvCxnSpPr>
+          <p:cNvPr id="12" name="Straight Arrow Connector 11"/>
+          <p:cNvCxnSpPr/>
+          <p:nvPr/>
+        </p:nvCxnSpPr>
+        <p:spPr>
+          <a:xfrm>
+            <a:off x="289157" y="3631617"/>
+            <a:ext cx="438913" cy="0"/>
+          </a:xfrm>
+          <a:prstGeom prst="straightConnector1">
+            <a:avLst/>
+          </a:prstGeom>
+          <a:ln w="28575">
+            <a:tailEnd type="triangle"/>
+          </a:ln>
+        </p:spPr>
+        <p:style>
+          <a:lnRef idx="1">
+            <a:schemeClr val="dk1"/>
+          </a:lnRef>
+          <a:fillRef idx="0">
+            <a:schemeClr val="dk1"/>
+          </a:fillRef>
+          <a:effectRef idx="0">
+            <a:schemeClr val="dk1"/>
+          </a:effectRef>
+          <a:fontRef idx="minor">
+            <a:schemeClr val="tx1"/>
+          </a:fontRef>
+        </p:style>
+      </p:cxnSp>
+      <p:cxnSp>
+        <p:nvCxnSpPr>
+          <p:cNvPr id="13" name="Straight Arrow Connector 12"/>
+          <p:cNvCxnSpPr/>
+          <p:nvPr/>
+        </p:nvCxnSpPr>
+        <p:spPr>
+          <a:xfrm>
+            <a:off x="287633" y="1930834"/>
+            <a:ext cx="438913" cy="0"/>
+          </a:xfrm>
+          <a:prstGeom prst="straightConnector1">
+            <a:avLst/>
+          </a:prstGeom>
+          <a:ln w="28575">
+            <a:tailEnd type="triangle"/>
+          </a:ln>
+        </p:spPr>
+        <p:style>
+          <a:lnRef idx="1">
+            <a:schemeClr val="dk1"/>
+          </a:lnRef>
+          <a:fillRef idx="0">
+            <a:schemeClr val="dk1"/>
+          </a:fillRef>
+          <a:effectRef idx="0">
+            <a:schemeClr val="dk1"/>
+          </a:effectRef>
+          <a:fontRef idx="minor">
+            <a:schemeClr val="tx1"/>
+          </a:fontRef>
+        </p:style>
+      </p:cxnSp>
+      <p:cxnSp>
+        <p:nvCxnSpPr>
+          <p:cNvPr id="20" name="Straight Connector 19"/>
+          <p:cNvCxnSpPr/>
+          <p:nvPr/>
+        </p:nvCxnSpPr>
+        <p:spPr>
+          <a:xfrm>
+            <a:off x="300587" y="268150"/>
+            <a:ext cx="0" cy="3363467"/>
+          </a:xfrm>
+          <a:prstGeom prst="line">
+            <a:avLst/>
+          </a:prstGeom>
+          <a:ln w="28575"/>
+        </p:spPr>
+        <p:style>
+          <a:lnRef idx="1">
+            <a:schemeClr val="dk1"/>
+          </a:lnRef>
+          <a:fillRef idx="0">
+            <a:schemeClr val="dk1"/>
+          </a:fillRef>
+          <a:effectRef idx="0">
+            <a:schemeClr val="dk1"/>
+          </a:effectRef>
+          <a:fontRef idx="minor">
+            <a:schemeClr val="tx1"/>
+          </a:fontRef>
+        </p:style>
+      </p:cxnSp>
+      <p:cxnSp>
+        <p:nvCxnSpPr>
+          <p:cNvPr id="21" name="Straight Connector 20"/>
+          <p:cNvCxnSpPr/>
+          <p:nvPr/>
+        </p:nvCxnSpPr>
+        <p:spPr>
+          <a:xfrm flipH="1">
+            <a:off x="750929" y="656008"/>
+            <a:ext cx="0" cy="859537"/>
+          </a:xfrm>
+          <a:prstGeom prst="line">
+            <a:avLst/>
+          </a:prstGeom>
+          <a:ln w="28575"/>
+        </p:spPr>
+        <p:style>
+          <a:lnRef idx="1">
+            <a:schemeClr val="dk1"/>
+          </a:lnRef>
+          <a:fillRef idx="0">
+            <a:schemeClr val="dk1"/>
+          </a:fillRef>
+          <a:effectRef idx="0">
+            <a:schemeClr val="dk1"/>
+          </a:effectRef>
+          <a:fontRef idx="minor">
+            <a:schemeClr val="tx1"/>
+          </a:fontRef>
+        </p:style>
+      </p:cxnSp>
+      <p:cxnSp>
+        <p:nvCxnSpPr>
+          <p:cNvPr id="23" name="Straight Connector 22"/>
+          <p:cNvCxnSpPr/>
+          <p:nvPr/>
+        </p:nvCxnSpPr>
+        <p:spPr>
+          <a:xfrm>
+            <a:off x="775313" y="1926767"/>
+            <a:ext cx="0" cy="870967"/>
+          </a:xfrm>
+          <a:prstGeom prst="line">
+            <a:avLst/>
+          </a:prstGeom>
+          <a:ln w="28575"/>
+        </p:spPr>
+        <p:style>
+          <a:lnRef idx="1">
+            <a:schemeClr val="dk1"/>
+          </a:lnRef>
+          <a:fillRef idx="0">
+            <a:schemeClr val="dk1"/>
+          </a:fillRef>
+          <a:effectRef idx="0">
+            <a:schemeClr val="dk1"/>
+          </a:effectRef>
+          <a:fontRef idx="minor">
+            <a:schemeClr val="tx1"/>
+          </a:fontRef>
+        </p:style>
+      </p:cxnSp>
+      <p:cxnSp>
+        <p:nvCxnSpPr>
+          <p:cNvPr id="24" name="Straight Connector 23"/>
+          <p:cNvCxnSpPr/>
+          <p:nvPr/>
+        </p:nvCxnSpPr>
+        <p:spPr>
+          <a:xfrm flipH="1">
+            <a:off x="757026" y="3631617"/>
+            <a:ext cx="0" cy="434084"/>
+          </a:xfrm>
+          <a:prstGeom prst="line">
+            <a:avLst/>
+          </a:prstGeom>
+          <a:ln w="28575"/>
+        </p:spPr>
+        <p:style>
+          <a:lnRef idx="1">
+            <a:schemeClr val="dk1"/>
+          </a:lnRef>
+          <a:fillRef idx="0">
+            <a:schemeClr val="dk1"/>
+          </a:fillRef>
+          <a:effectRef idx="0">
+            <a:schemeClr val="dk1"/>
+          </a:effectRef>
+          <a:fontRef idx="minor">
+            <a:schemeClr val="tx1"/>
+          </a:fontRef>
+        </p:style>
+      </p:cxnSp>
+      <p:cxnSp>
+        <p:nvCxnSpPr>
+          <p:cNvPr id="25" name="Straight Arrow Connector 24"/>
+          <p:cNvCxnSpPr/>
+          <p:nvPr/>
+        </p:nvCxnSpPr>
+        <p:spPr>
+          <a:xfrm>
+            <a:off x="744834" y="1076631"/>
+            <a:ext cx="438913" cy="0"/>
+          </a:xfrm>
+          <a:prstGeom prst="straightConnector1">
+            <a:avLst/>
+          </a:prstGeom>
+          <a:ln w="28575">
+            <a:tailEnd type="triangle"/>
+          </a:ln>
+        </p:spPr>
+        <p:style>
+          <a:lnRef idx="1">
+            <a:schemeClr val="dk1"/>
+          </a:lnRef>
+          <a:fillRef idx="0">
+            <a:schemeClr val="dk1"/>
+          </a:fillRef>
+          <a:effectRef idx="0">
+            <a:schemeClr val="dk1"/>
+          </a:effectRef>
+          <a:fontRef idx="minor">
+            <a:schemeClr val="tx1"/>
+          </a:fontRef>
+        </p:style>
+      </p:cxnSp>
+      <p:cxnSp>
+        <p:nvCxnSpPr>
+          <p:cNvPr id="26" name="Straight Arrow Connector 25"/>
+          <p:cNvCxnSpPr/>
+          <p:nvPr/>
+        </p:nvCxnSpPr>
+        <p:spPr>
+          <a:xfrm>
+            <a:off x="757025" y="1515543"/>
+            <a:ext cx="438913" cy="0"/>
+          </a:xfrm>
+          <a:prstGeom prst="straightConnector1">
+            <a:avLst/>
+          </a:prstGeom>
+          <a:ln w="28575">
+            <a:tailEnd type="triangle"/>
+          </a:ln>
+        </p:spPr>
+        <p:style>
+          <a:lnRef idx="1">
+            <a:schemeClr val="dk1"/>
+          </a:lnRef>
+          <a:fillRef idx="0">
+            <a:schemeClr val="dk1"/>
+          </a:fillRef>
+          <a:effectRef idx="0">
+            <a:schemeClr val="dk1"/>
+          </a:effectRef>
+          <a:fontRef idx="minor">
+            <a:schemeClr val="tx1"/>
+          </a:fontRef>
+        </p:style>
+      </p:cxnSp>
+      <p:cxnSp>
+        <p:nvCxnSpPr>
+          <p:cNvPr id="27" name="Straight Arrow Connector 26"/>
+          <p:cNvCxnSpPr/>
+          <p:nvPr/>
+        </p:nvCxnSpPr>
+        <p:spPr>
+          <a:xfrm>
+            <a:off x="793601" y="2340533"/>
+            <a:ext cx="438913" cy="0"/>
+          </a:xfrm>
+          <a:prstGeom prst="straightConnector1">
+            <a:avLst/>
+          </a:prstGeom>
+          <a:ln w="28575">
+            <a:tailEnd type="triangle"/>
+          </a:ln>
+        </p:spPr>
+        <p:style>
+          <a:lnRef idx="1">
+            <a:schemeClr val="dk1"/>
+          </a:lnRef>
+          <a:fillRef idx="0">
+            <a:schemeClr val="dk1"/>
+          </a:fillRef>
+          <a:effectRef idx="0">
+            <a:schemeClr val="dk1"/>
+          </a:effectRef>
+          <a:fontRef idx="minor">
+            <a:schemeClr val="tx1"/>
+          </a:fontRef>
+        </p:style>
+      </p:cxnSp>
+      <p:cxnSp>
+        <p:nvCxnSpPr>
+          <p:cNvPr id="28" name="Straight Arrow Connector 27"/>
+          <p:cNvCxnSpPr/>
+          <p:nvPr/>
+        </p:nvCxnSpPr>
+        <p:spPr>
+          <a:xfrm>
+            <a:off x="775314" y="2797733"/>
+            <a:ext cx="438913" cy="0"/>
+          </a:xfrm>
+          <a:prstGeom prst="straightConnector1">
+            <a:avLst/>
+          </a:prstGeom>
+          <a:ln w="28575">
+            <a:tailEnd type="triangle"/>
+          </a:ln>
+        </p:spPr>
+        <p:style>
+          <a:lnRef idx="1">
+            <a:schemeClr val="dk1"/>
+          </a:lnRef>
+          <a:fillRef idx="0">
+            <a:schemeClr val="dk1"/>
+          </a:fillRef>
+          <a:effectRef idx="0">
+            <a:schemeClr val="dk1"/>
+          </a:effectRef>
+          <a:fontRef idx="minor">
+            <a:schemeClr val="tx1"/>
+          </a:fontRef>
+        </p:style>
+      </p:cxnSp>
+      <p:cxnSp>
+        <p:nvCxnSpPr>
+          <p:cNvPr id="29" name="Straight Arrow Connector 28"/>
+          <p:cNvCxnSpPr/>
+          <p:nvPr/>
+        </p:nvCxnSpPr>
+        <p:spPr>
+          <a:xfrm>
+            <a:off x="750929" y="4065701"/>
+            <a:ext cx="438913" cy="0"/>
+          </a:xfrm>
+          <a:prstGeom prst="straightConnector1">
+            <a:avLst/>
+          </a:prstGeom>
+          <a:ln w="28575">
+            <a:tailEnd type="triangle"/>
+          </a:ln>
+        </p:spPr>
+        <p:style>
+          <a:lnRef idx="1">
+            <a:schemeClr val="dk1"/>
+          </a:lnRef>
+          <a:fillRef idx="0">
+            <a:schemeClr val="dk1"/>
+          </a:fillRef>
+          <a:effectRef idx="0">
+            <a:schemeClr val="dk1"/>
+          </a:effectRef>
+          <a:fontRef idx="minor">
+            <a:schemeClr val="tx1"/>
+          </a:fontRef>
+        </p:style>
+      </p:cxnSp>
+    </p:spTree>
+    <p:extLst>
+      <p:ext uri="{BB962C8B-B14F-4D97-AF65-F5344CB8AC3E}">
+        <p14:creationId xmlns:p14="http://schemas.microsoft.com/office/powerpoint/2010/main" val="2303138607"/>
+      </p:ext>
+    </p:extLst>
+  </p:cSld>
+  <p:clrMapOvr>
+    <a:masterClrMapping/>
+  </p:clrMapOvr>
+  <p:timing>
+    <p:tnLst>
+      <p:par>
+        <p:cTn id="1" dur="indefinite" restart="never" nodeType="tmRoot"/>
+      </p:par>
+    </p:tnLst>
+  </p:timing>
 </p:sld>
 </file>
 
@@ -4002,4 +5888,265 @@
     </a:ext>
   </a:extLst>
 </a:theme>
+</file>
+
+<file path=ppt/theme/theme2.xml><?xml version="1.0" encoding="utf-8"?>
+<a:theme xmlns:a="http://schemas.openxmlformats.org/drawingml/2006/main" name="Office Theme">
+  <a:themeElements>
+    <a:clrScheme name="Office">
+      <a:dk1>
+        <a:sysClr val="windowText" lastClr="000000"/>
+      </a:dk1>
+      <a:lt1>
+        <a:sysClr val="window" lastClr="FFFFFF"/>
+      </a:lt1>
+      <a:dk2>
+        <a:srgbClr val="44546A"/>
+      </a:dk2>
+      <a:lt2>
+        <a:srgbClr val="E7E6E6"/>
+      </a:lt2>
+      <a:accent1>
+        <a:srgbClr val="5B9BD5"/>
+      </a:accent1>
+      <a:accent2>
+        <a:srgbClr val="ED7D31"/>
+      </a:accent2>
+      <a:accent3>
+        <a:srgbClr val="A5A5A5"/>
+      </a:accent3>
+      <a:accent4>
+        <a:srgbClr val="FFC000"/>
+      </a:accent4>
+      <a:accent5>
+        <a:srgbClr val="4472C4"/>
+      </a:accent5>
+      <a:accent6>
+        <a:srgbClr val="70AD47"/>
+      </a:accent6>
+      <a:hlink>
+        <a:srgbClr val="0563C1"/>
+      </a:hlink>
+      <a:folHlink>
+        <a:srgbClr val="954F72"/>
+      </a:folHlink>
+    </a:clrScheme>
+    <a:fontScheme name="Office">
+      <a:majorFont>
+        <a:latin typeface="Calibri Light" panose="020F0302020204030204"/>
+        <a:ea typeface=""/>
+        <a:cs typeface=""/>
+        <a:font script="Jpan" typeface="ＭＳ Ｐゴシック"/>
+        <a:font script="Hang" typeface="맑은 고딕"/>
+        <a:font script="Hans" typeface="宋体"/>
+        <a:font script="Hant" typeface="新細明體"/>
+        <a:font script="Arab" typeface="Times New Roman"/>
+        <a:font script="Hebr" typeface="Times New Roman"/>
+        <a:font script="Thai" typeface="Angsana New"/>
+        <a:font script="Ethi" typeface="Nyala"/>
+        <a:font script="Beng" typeface="Vrinda"/>
+        <a:font script="Gujr" typeface="Shruti"/>
+        <a:font script="Khmr" typeface="MoolBoran"/>
+        <a:font script="Knda" typeface="Tunga"/>
+        <a:font script="Guru" typeface="Raavi"/>
+        <a:font script="Cans" typeface="Euphemia"/>
+        <a:font script="Cher" typeface="Plantagenet Cherokee"/>
+        <a:font script="Yiii" typeface="Microsoft Yi Baiti"/>
+        <a:font script="Tibt" typeface="Microsoft Himalaya"/>
+        <a:font script="Thaa" typeface="MV Boli"/>
+        <a:font script="Deva" typeface="Mangal"/>
+        <a:font script="Telu" typeface="Gautami"/>
+        <a:font script="Taml" typeface="Latha"/>
+        <a:font script="Syrc" typeface="Estrangelo Edessa"/>
+        <a:font script="Orya" typeface="Kalinga"/>
+        <a:font script="Mlym" typeface="Kartika"/>
+        <a:font script="Laoo" typeface="DokChampa"/>
+        <a:font script="Sinh" typeface="Iskoola Pota"/>
+        <a:font script="Mong" typeface="Mongolian Baiti"/>
+        <a:font script="Viet" typeface="Times New Roman"/>
+        <a:font script="Uigh" typeface="Microsoft Uighur"/>
+        <a:font script="Geor" typeface="Sylfaen"/>
+      </a:majorFont>
+      <a:minorFont>
+        <a:latin typeface="Calibri" panose="020F0502020204030204"/>
+        <a:ea typeface=""/>
+        <a:cs typeface=""/>
+        <a:font script="Jpan" typeface="ＭＳ Ｐゴシック"/>
+        <a:font script="Hang" typeface="맑은 고딕"/>
+        <a:font script="Hans" typeface="宋体"/>
+        <a:font script="Hant" typeface="新細明體"/>
+        <a:font script="Arab" typeface="Arial"/>
+        <a:font script="Hebr" typeface="Arial"/>
+        <a:font script="Thai" typeface="Cordia New"/>
+        <a:font script="Ethi" typeface="Nyala"/>
+        <a:font script="Beng" typeface="Vrinda"/>
+        <a:font script="Gujr" typeface="Shruti"/>
+        <a:font script="Khmr" typeface="DaunPenh"/>
+        <a:font script="Knda" typeface="Tunga"/>
+        <a:font script="Guru" typeface="Raavi"/>
+        <a:font script="Cans" typeface="Euphemia"/>
+        <a:font script="Cher" typeface="Plantagenet Cherokee"/>
+        <a:font script="Yiii" typeface="Microsoft Yi Baiti"/>
+        <a:font script="Tibt" typeface="Microsoft Himalaya"/>
+        <a:font script="Thaa" typeface="MV Boli"/>
+        <a:font script="Deva" typeface="Mangal"/>
+        <a:font script="Telu" typeface="Gautami"/>
+        <a:font script="Taml" typeface="Latha"/>
+        <a:font script="Syrc" typeface="Estrangelo Edessa"/>
+        <a:font script="Orya" typeface="Kalinga"/>
+        <a:font script="Mlym" typeface="Kartika"/>
+        <a:font script="Laoo" typeface="DokChampa"/>
+        <a:font script="Sinh" typeface="Iskoola Pota"/>
+        <a:font script="Mong" typeface="Mongolian Baiti"/>
+        <a:font script="Viet" typeface="Arial"/>
+        <a:font script="Uigh" typeface="Microsoft Uighur"/>
+        <a:font script="Geor" typeface="Sylfaen"/>
+      </a:minorFont>
+    </a:fontScheme>
+    <a:fmtScheme name="Office">
+      <a:fillStyleLst>
+        <a:solidFill>
+          <a:schemeClr val="phClr"/>
+        </a:solidFill>
+        <a:gradFill rotWithShape="1">
+          <a:gsLst>
+            <a:gs pos="0">
+              <a:schemeClr val="phClr">
+                <a:lumMod val="110000"/>
+                <a:satMod val="105000"/>
+                <a:tint val="67000"/>
+              </a:schemeClr>
+            </a:gs>
+            <a:gs pos="50000">
+              <a:schemeClr val="phClr">
+                <a:lumMod val="105000"/>
+                <a:satMod val="103000"/>
+                <a:tint val="73000"/>
+              </a:schemeClr>
+            </a:gs>
+            <a:gs pos="100000">
+              <a:schemeClr val="phClr">
+                <a:lumMod val="105000"/>
+                <a:satMod val="109000"/>
+                <a:tint val="81000"/>
+              </a:schemeClr>
+            </a:gs>
+          </a:gsLst>
+          <a:lin ang="5400000" scaled="0"/>
+        </a:gradFill>
+        <a:gradFill rotWithShape="1">
+          <a:gsLst>
+            <a:gs pos="0">
+              <a:schemeClr val="phClr">
+                <a:satMod val="103000"/>
+                <a:lumMod val="102000"/>
+                <a:tint val="94000"/>
+              </a:schemeClr>
+            </a:gs>
+            <a:gs pos="50000">
+              <a:schemeClr val="phClr">
+                <a:satMod val="110000"/>
+                <a:lumMod val="100000"/>
+                <a:shade val="100000"/>
+              </a:schemeClr>
+            </a:gs>
+            <a:gs pos="100000">
+              <a:schemeClr val="phClr">
+                <a:lumMod val="99000"/>
+                <a:satMod val="120000"/>
+                <a:shade val="78000"/>
+              </a:schemeClr>
+            </a:gs>
+          </a:gsLst>
+          <a:lin ang="5400000" scaled="0"/>
+        </a:gradFill>
+      </a:fillStyleLst>
+      <a:lnStyleLst>
+        <a:ln w="6350" cap="flat" cmpd="sng" algn="ctr">
+          <a:solidFill>
+            <a:schemeClr val="phClr"/>
+          </a:solidFill>
+          <a:prstDash val="solid"/>
+          <a:miter lim="800000"/>
+        </a:ln>
+        <a:ln w="12700" cap="flat" cmpd="sng" algn="ctr">
+          <a:solidFill>
+            <a:schemeClr val="phClr"/>
+          </a:solidFill>
+          <a:prstDash val="solid"/>
+          <a:miter lim="800000"/>
+        </a:ln>
+        <a:ln w="19050" cap="flat" cmpd="sng" algn="ctr">
+          <a:solidFill>
+            <a:schemeClr val="phClr"/>
+          </a:solidFill>
+          <a:prstDash val="solid"/>
+          <a:miter lim="800000"/>
+        </a:ln>
+      </a:lnStyleLst>
+      <a:effectStyleLst>
+        <a:effectStyle>
+          <a:effectLst/>
+        </a:effectStyle>
+        <a:effectStyle>
+          <a:effectLst/>
+        </a:effectStyle>
+        <a:effectStyle>
+          <a:effectLst>
+            <a:outerShdw blurRad="57150" dist="19050" dir="5400000" algn="ctr" rotWithShape="0">
+              <a:srgbClr val="000000">
+                <a:alpha val="63000"/>
+              </a:srgbClr>
+            </a:outerShdw>
+          </a:effectLst>
+        </a:effectStyle>
+      </a:effectStyleLst>
+      <a:bgFillStyleLst>
+        <a:solidFill>
+          <a:schemeClr val="phClr"/>
+        </a:solidFill>
+        <a:solidFill>
+          <a:schemeClr val="phClr">
+            <a:tint val="95000"/>
+            <a:satMod val="170000"/>
+          </a:schemeClr>
+        </a:solidFill>
+        <a:gradFill rotWithShape="1">
+          <a:gsLst>
+            <a:gs pos="0">
+              <a:schemeClr val="phClr">
+                <a:tint val="93000"/>
+                <a:satMod val="150000"/>
+                <a:shade val="98000"/>
+                <a:lumMod val="102000"/>
+              </a:schemeClr>
+            </a:gs>
+            <a:gs pos="50000">
+              <a:schemeClr val="phClr">
+                <a:tint val="98000"/>
+                <a:satMod val="130000"/>
+                <a:shade val="90000"/>
+                <a:lumMod val="103000"/>
+              </a:schemeClr>
+            </a:gs>
+            <a:gs pos="100000">
+              <a:schemeClr val="phClr">
+                <a:shade val="63000"/>
+                <a:satMod val="120000"/>
+              </a:schemeClr>
+            </a:gs>
+          </a:gsLst>
+          <a:lin ang="5400000" scaled="0"/>
+        </a:gradFill>
+      </a:bgFillStyleLst>
+    </a:fmtScheme>
+  </a:themeElements>
+  <a:objectDefaults/>
+  <a:extraClrSchemeLst/>
+  <a:extLst>
+    <a:ext uri="{05A4C25C-085E-4340-85A3-A5531E510DB2}">
+      <thm15:themeFamily xmlns:thm15="http://schemas.microsoft.com/office/thememl/2012/main" name="Office Theme" id="{62F939B6-93AF-4DB8-9C6B-D6C7DFDC589F}" vid="{4A3C46E8-61CC-4603-A589-7422A47A8E4A}"/>
+    </a:ext>
+  </a:extLst>
+</a:theme>
 </file>
</xml_diff>